<commit_message>
committing before deleting unnecessary files
</commit_message>
<xml_diff>
--- a/computational_model/figures/model comaprison and validation.pptx
+++ b/computational_model/figures/model comaprison and validation.pptx
@@ -2,18 +2,18 @@
 <file path=ppt/presentation.xml><?xml version="1.0" encoding="utf-8"?>
 <p:presentation xmlns:a="http://schemas.openxmlformats.org/drawingml/2006/main" xmlns:r="http://schemas.openxmlformats.org/officeDocument/2006/relationships" xmlns:p="http://schemas.openxmlformats.org/presentationml/2006/main" saveSubsetFonts="1" autoCompressPictures="0">
   <p:sldMasterIdLst>
-    <p:sldMasterId id="2147483648" r:id="rId1"/>
+    <p:sldMasterId id="2147483672" r:id="rId1"/>
   </p:sldMasterIdLst>
   <p:sldIdLst>
     <p:sldId id="256" r:id="rId2"/>
   </p:sldIdLst>
-  <p:sldSz cx="12192000" cy="6858000"/>
+  <p:sldSz cx="11879263" cy="6516688"/>
   <p:notesSz cx="6858000" cy="9144000"/>
   <p:defaultTextStyle>
     <a:defPPr>
-      <a:defRPr lang="en-DE"/>
+      <a:defRPr lang="en-US"/>
     </a:defPPr>
-    <a:lvl1pPr marL="0" algn="l" defTabSz="914400" rtl="0" eaLnBrk="1" latinLnBrk="0" hangingPunct="1">
+    <a:lvl1pPr marL="0" algn="l" defTabSz="457200" rtl="0" eaLnBrk="1" latinLnBrk="0" hangingPunct="1">
       <a:defRPr sz="1800" kern="1200">
         <a:solidFill>
           <a:schemeClr val="tx1"/>
@@ -23,7 +23,7 @@
         <a:cs typeface="+mn-cs"/>
       </a:defRPr>
     </a:lvl1pPr>
-    <a:lvl2pPr marL="457200" algn="l" defTabSz="914400" rtl="0" eaLnBrk="1" latinLnBrk="0" hangingPunct="1">
+    <a:lvl2pPr marL="457200" algn="l" defTabSz="457200" rtl="0" eaLnBrk="1" latinLnBrk="0" hangingPunct="1">
       <a:defRPr sz="1800" kern="1200">
         <a:solidFill>
           <a:schemeClr val="tx1"/>
@@ -33,7 +33,7 @@
         <a:cs typeface="+mn-cs"/>
       </a:defRPr>
     </a:lvl2pPr>
-    <a:lvl3pPr marL="914400" algn="l" defTabSz="914400" rtl="0" eaLnBrk="1" latinLnBrk="0" hangingPunct="1">
+    <a:lvl3pPr marL="914400" algn="l" defTabSz="457200" rtl="0" eaLnBrk="1" latinLnBrk="0" hangingPunct="1">
       <a:defRPr sz="1800" kern="1200">
         <a:solidFill>
           <a:schemeClr val="tx1"/>
@@ -43,7 +43,7 @@
         <a:cs typeface="+mn-cs"/>
       </a:defRPr>
     </a:lvl3pPr>
-    <a:lvl4pPr marL="1371600" algn="l" defTabSz="914400" rtl="0" eaLnBrk="1" latinLnBrk="0" hangingPunct="1">
+    <a:lvl4pPr marL="1371600" algn="l" defTabSz="457200" rtl="0" eaLnBrk="1" latinLnBrk="0" hangingPunct="1">
       <a:defRPr sz="1800" kern="1200">
         <a:solidFill>
           <a:schemeClr val="tx1"/>
@@ -53,7 +53,7 @@
         <a:cs typeface="+mn-cs"/>
       </a:defRPr>
     </a:lvl4pPr>
-    <a:lvl5pPr marL="1828800" algn="l" defTabSz="914400" rtl="0" eaLnBrk="1" latinLnBrk="0" hangingPunct="1">
+    <a:lvl5pPr marL="1828800" algn="l" defTabSz="457200" rtl="0" eaLnBrk="1" latinLnBrk="0" hangingPunct="1">
       <a:defRPr sz="1800" kern="1200">
         <a:solidFill>
           <a:schemeClr val="tx1"/>
@@ -63,7 +63,7 @@
         <a:cs typeface="+mn-cs"/>
       </a:defRPr>
     </a:lvl5pPr>
-    <a:lvl6pPr marL="2286000" algn="l" defTabSz="914400" rtl="0" eaLnBrk="1" latinLnBrk="0" hangingPunct="1">
+    <a:lvl6pPr marL="2286000" algn="l" defTabSz="457200" rtl="0" eaLnBrk="1" latinLnBrk="0" hangingPunct="1">
       <a:defRPr sz="1800" kern="1200">
         <a:solidFill>
           <a:schemeClr val="tx1"/>
@@ -73,7 +73,7 @@
         <a:cs typeface="+mn-cs"/>
       </a:defRPr>
     </a:lvl6pPr>
-    <a:lvl7pPr marL="2743200" algn="l" defTabSz="914400" rtl="0" eaLnBrk="1" latinLnBrk="0" hangingPunct="1">
+    <a:lvl7pPr marL="2743200" algn="l" defTabSz="457200" rtl="0" eaLnBrk="1" latinLnBrk="0" hangingPunct="1">
       <a:defRPr sz="1800" kern="1200">
         <a:solidFill>
           <a:schemeClr val="tx1"/>
@@ -83,7 +83,7 @@
         <a:cs typeface="+mn-cs"/>
       </a:defRPr>
     </a:lvl7pPr>
-    <a:lvl8pPr marL="3200400" algn="l" defTabSz="914400" rtl="0" eaLnBrk="1" latinLnBrk="0" hangingPunct="1">
+    <a:lvl8pPr marL="3200400" algn="l" defTabSz="457200" rtl="0" eaLnBrk="1" latinLnBrk="0" hangingPunct="1">
       <a:defRPr sz="1800" kern="1200">
         <a:solidFill>
           <a:schemeClr val="tx1"/>
@@ -93,7 +93,7 @@
         <a:cs typeface="+mn-cs"/>
       </a:defRPr>
     </a:lvl8pPr>
-    <a:lvl9pPr marL="3657600" algn="l" defTabSz="914400" rtl="0" eaLnBrk="1" latinLnBrk="0" hangingPunct="1">
+    <a:lvl9pPr marL="3657600" algn="l" defTabSz="457200" rtl="0" eaLnBrk="1" latinLnBrk="0" hangingPunct="1">
       <a:defRPr sz="1800" kern="1200">
         <a:solidFill>
           <a:schemeClr val="tx1"/>
@@ -104,6 +104,22 @@
       </a:defRPr>
     </a:lvl9pPr>
   </p:defaultTextStyle>
+  <p:extLst>
+    <p:ext uri="{EFAFB233-063F-42B5-8137-9DF3F51BA10A}">
+      <p15:sldGuideLst xmlns:p15="http://schemas.microsoft.com/office/powerpoint/2012/main">
+        <p15:guide id="1" orient="horz" pos="2053" userDrawn="1">
+          <p15:clr>
+            <a:srgbClr val="A4A3A4"/>
+          </p15:clr>
+        </p15:guide>
+        <p15:guide id="2" pos="3742" userDrawn="1">
+          <p15:clr>
+            <a:srgbClr val="A4A3A4"/>
+          </p15:clr>
+        </p15:guide>
+      </p15:sldGuideLst>
+    </p:ext>
+  </p:extLst>
 </p:presentation>
 </file>
 
@@ -126,13 +142,7 @@
       </p:grpSpPr>
       <p:sp>
         <p:nvSpPr>
-          <p:cNvPr id="2" name="Title 1">
-            <a:extLst>
-              <a:ext uri="{FF2B5EF4-FFF2-40B4-BE49-F238E27FC236}">
-                <a16:creationId xmlns:a16="http://schemas.microsoft.com/office/drawing/2014/main" id="{FACBF166-4BE1-B1B2-F944-4A7ABF351542}"/>
-              </a:ext>
-            </a:extLst>
-          </p:cNvPr>
+          <p:cNvPr id="2" name="Title 1"/>
           <p:cNvSpPr>
             <a:spLocks noGrp="1"/>
           </p:cNvSpPr>
@@ -142,15 +152,15 @@
         </p:nvSpPr>
         <p:spPr>
           <a:xfrm>
-            <a:off x="1524000" y="1122363"/>
-            <a:ext cx="9144000" cy="2387600"/>
+            <a:off x="1484908" y="1066505"/>
+            <a:ext cx="8909447" cy="2268773"/>
           </a:xfrm>
         </p:spPr>
         <p:txBody>
           <a:bodyPr anchor="b"/>
           <a:lstStyle>
             <a:lvl1pPr algn="ctr">
-              <a:defRPr sz="6000"/>
+              <a:defRPr sz="5701"/>
             </a:lvl1pPr>
           </a:lstStyle>
           <a:p>
@@ -158,19 +168,13 @@
               <a:rPr lang="en-GB"/>
               <a:t>Click to edit Master title style</a:t>
             </a:r>
-            <a:endParaRPr lang="en-DE"/>
-          </a:p>
-        </p:txBody>
-      </p:sp>
-      <p:sp>
-        <p:nvSpPr>
-          <p:cNvPr id="3" name="Subtitle 2">
-            <a:extLst>
-              <a:ext uri="{FF2B5EF4-FFF2-40B4-BE49-F238E27FC236}">
-                <a16:creationId xmlns:a16="http://schemas.microsoft.com/office/drawing/2014/main" id="{74819E2F-909C-F9E0-FCBA-7014B93D4F52}"/>
-              </a:ext>
-            </a:extLst>
-          </p:cNvPr>
+            <a:endParaRPr lang="en-US" dirty="0"/>
+          </a:p>
+        </p:txBody>
+      </p:sp>
+      <p:sp>
+        <p:nvSpPr>
+          <p:cNvPr id="3" name="Subtitle 2"/>
           <p:cNvSpPr>
             <a:spLocks noGrp="1"/>
           </p:cNvSpPr>
@@ -180,8 +184,8 @@
         </p:nvSpPr>
         <p:spPr>
           <a:xfrm>
-            <a:off x="1524000" y="3602038"/>
-            <a:ext cx="9144000" cy="1655762"/>
+            <a:off x="1484908" y="3422770"/>
+            <a:ext cx="8909447" cy="1573357"/>
           </a:xfrm>
         </p:spPr>
         <p:txBody>
@@ -189,39 +193,39 @@
           <a:lstStyle>
             <a:lvl1pPr marL="0" indent="0" algn="ctr">
               <a:buNone/>
-              <a:defRPr sz="2400"/>
+              <a:defRPr sz="2280"/>
             </a:lvl1pPr>
-            <a:lvl2pPr marL="457200" indent="0" algn="ctr">
-              <a:buNone/>
-              <a:defRPr sz="2000"/>
+            <a:lvl2pPr marL="434431" indent="0" algn="ctr">
+              <a:buNone/>
+              <a:defRPr sz="1900"/>
             </a:lvl2pPr>
-            <a:lvl3pPr marL="914400" indent="0" algn="ctr">
-              <a:buNone/>
-              <a:defRPr sz="1800"/>
+            <a:lvl3pPr marL="868863" indent="0" algn="ctr">
+              <a:buNone/>
+              <a:defRPr sz="1710"/>
             </a:lvl3pPr>
-            <a:lvl4pPr marL="1371600" indent="0" algn="ctr">
-              <a:buNone/>
-              <a:defRPr sz="1600"/>
+            <a:lvl4pPr marL="1303294" indent="0" algn="ctr">
+              <a:buNone/>
+              <a:defRPr sz="1520"/>
             </a:lvl4pPr>
-            <a:lvl5pPr marL="1828800" indent="0" algn="ctr">
-              <a:buNone/>
-              <a:defRPr sz="1600"/>
+            <a:lvl5pPr marL="1737726" indent="0" algn="ctr">
+              <a:buNone/>
+              <a:defRPr sz="1520"/>
             </a:lvl5pPr>
-            <a:lvl6pPr marL="2286000" indent="0" algn="ctr">
-              <a:buNone/>
-              <a:defRPr sz="1600"/>
+            <a:lvl6pPr marL="2172157" indent="0" algn="ctr">
+              <a:buNone/>
+              <a:defRPr sz="1520"/>
             </a:lvl6pPr>
-            <a:lvl7pPr marL="2743200" indent="0" algn="ctr">
-              <a:buNone/>
-              <a:defRPr sz="1600"/>
+            <a:lvl7pPr marL="2606589" indent="0" algn="ctr">
+              <a:buNone/>
+              <a:defRPr sz="1520"/>
             </a:lvl7pPr>
-            <a:lvl8pPr marL="3200400" indent="0" algn="ctr">
-              <a:buNone/>
-              <a:defRPr sz="1600"/>
+            <a:lvl8pPr marL="3041020" indent="0" algn="ctr">
+              <a:buNone/>
+              <a:defRPr sz="1520"/>
             </a:lvl8pPr>
-            <a:lvl9pPr marL="3657600" indent="0" algn="ctr">
-              <a:buNone/>
-              <a:defRPr sz="1600"/>
+            <a:lvl9pPr marL="3475452" indent="0" algn="ctr">
+              <a:buNone/>
+              <a:defRPr sz="1520"/>
             </a:lvl9pPr>
           </a:lstStyle>
           <a:p>
@@ -229,19 +233,13 @@
               <a:rPr lang="en-GB"/>
               <a:t>Click to edit Master subtitle style</a:t>
             </a:r>
-            <a:endParaRPr lang="en-DE"/>
-          </a:p>
-        </p:txBody>
-      </p:sp>
-      <p:sp>
-        <p:nvSpPr>
-          <p:cNvPr id="4" name="Date Placeholder 3">
-            <a:extLst>
-              <a:ext uri="{FF2B5EF4-FFF2-40B4-BE49-F238E27FC236}">
-                <a16:creationId xmlns:a16="http://schemas.microsoft.com/office/drawing/2014/main" id="{166657F0-033E-51F1-A640-744265994FFA}"/>
-              </a:ext>
-            </a:extLst>
-          </p:cNvPr>
+            <a:endParaRPr lang="en-US" dirty="0"/>
+          </a:p>
+        </p:txBody>
+      </p:sp>
+      <p:sp>
+        <p:nvSpPr>
+          <p:cNvPr id="4" name="Date Placeholder 3"/>
           <p:cNvSpPr>
             <a:spLocks noGrp="1"/>
           </p:cNvSpPr>
@@ -254,9 +252,9 @@
           <a:bodyPr/>
           <a:lstStyle/>
           <a:p>
-            <a:fld id="{4BA8C318-080F-194F-AFAE-76709D53A411}" type="datetimeFigureOut">
+            <a:fld id="{5D5EEEB1-9457-F541-8E93-E8346267924A}" type="datetimeFigureOut">
               <a:rPr lang="en-DE" smtClean="0"/>
-              <a:t>19.04.22</a:t>
+              <a:t>10.05.22</a:t>
             </a:fld>
             <a:endParaRPr lang="en-DE"/>
           </a:p>
@@ -264,13 +262,7 @@
       </p:sp>
       <p:sp>
         <p:nvSpPr>
-          <p:cNvPr id="5" name="Footer Placeholder 4">
-            <a:extLst>
-              <a:ext uri="{FF2B5EF4-FFF2-40B4-BE49-F238E27FC236}">
-                <a16:creationId xmlns:a16="http://schemas.microsoft.com/office/drawing/2014/main" id="{36AD701B-331D-9C0D-9B83-0D9BE78E9BAA}"/>
-              </a:ext>
-            </a:extLst>
-          </p:cNvPr>
+          <p:cNvPr id="5" name="Footer Placeholder 4"/>
           <p:cNvSpPr>
             <a:spLocks noGrp="1"/>
           </p:cNvSpPr>
@@ -289,13 +281,7 @@
       </p:sp>
       <p:sp>
         <p:nvSpPr>
-          <p:cNvPr id="6" name="Slide Number Placeholder 5">
-            <a:extLst>
-              <a:ext uri="{FF2B5EF4-FFF2-40B4-BE49-F238E27FC236}">
-                <a16:creationId xmlns:a16="http://schemas.microsoft.com/office/drawing/2014/main" id="{2BD279A0-FA45-A919-1D7C-293F17996A71}"/>
-              </a:ext>
-            </a:extLst>
-          </p:cNvPr>
+          <p:cNvPr id="6" name="Slide Number Placeholder 5"/>
           <p:cNvSpPr>
             <a:spLocks noGrp="1"/>
           </p:cNvSpPr>
@@ -308,7 +294,7 @@
           <a:bodyPr/>
           <a:lstStyle/>
           <a:p>
-            <a:fld id="{3E641AC2-74A6-0B45-AA7A-FDD9099B35B0}" type="slidenum">
+            <a:fld id="{AD889EE7-EA20-7649-8640-1575DCB12BE0}" type="slidenum">
               <a:rPr lang="en-DE" smtClean="0"/>
               <a:t>‹#›</a:t>
             </a:fld>
@@ -319,7 +305,7 @@
     </p:spTree>
     <p:extLst>
       <p:ext uri="{BB962C8B-B14F-4D97-AF65-F5344CB8AC3E}">
-        <p14:creationId xmlns:p14="http://schemas.microsoft.com/office/powerpoint/2010/main" val="702334632"/>
+        <p14:creationId xmlns:p14="http://schemas.microsoft.com/office/powerpoint/2010/main" val="2958374362"/>
       </p:ext>
     </p:extLst>
   </p:cSld>
@@ -348,13 +334,7 @@
       </p:grpSpPr>
       <p:sp>
         <p:nvSpPr>
-          <p:cNvPr id="2" name="Title 1">
-            <a:extLst>
-              <a:ext uri="{FF2B5EF4-FFF2-40B4-BE49-F238E27FC236}">
-                <a16:creationId xmlns:a16="http://schemas.microsoft.com/office/drawing/2014/main" id="{B2B2EA36-152A-96BF-B375-BE3EFE6ECAEB}"/>
-              </a:ext>
-            </a:extLst>
-          </p:cNvPr>
+          <p:cNvPr id="2" name="Title 1"/>
           <p:cNvSpPr>
             <a:spLocks noGrp="1"/>
           </p:cNvSpPr>
@@ -371,19 +351,13 @@
               <a:rPr lang="en-GB"/>
               <a:t>Click to edit Master title style</a:t>
             </a:r>
-            <a:endParaRPr lang="en-DE"/>
-          </a:p>
-        </p:txBody>
-      </p:sp>
-      <p:sp>
-        <p:nvSpPr>
-          <p:cNvPr id="3" name="Vertical Text Placeholder 2">
-            <a:extLst>
-              <a:ext uri="{FF2B5EF4-FFF2-40B4-BE49-F238E27FC236}">
-                <a16:creationId xmlns:a16="http://schemas.microsoft.com/office/drawing/2014/main" id="{31784772-A77B-D266-A5B5-A9121B8BAE7C}"/>
-              </a:ext>
-            </a:extLst>
-          </p:cNvPr>
+            <a:endParaRPr lang="en-US" dirty="0"/>
+          </a:p>
+        </p:txBody>
+      </p:sp>
+      <p:sp>
+        <p:nvSpPr>
+          <p:cNvPr id="3" name="Vertical Text Placeholder 2"/>
           <p:cNvSpPr>
             <a:spLocks noGrp="1"/>
           </p:cNvSpPr>
@@ -429,19 +403,13 @@
               <a:rPr lang="en-GB"/>
               <a:t>Fifth level</a:t>
             </a:r>
-            <a:endParaRPr lang="en-DE"/>
-          </a:p>
-        </p:txBody>
-      </p:sp>
-      <p:sp>
-        <p:nvSpPr>
-          <p:cNvPr id="4" name="Date Placeholder 3">
-            <a:extLst>
-              <a:ext uri="{FF2B5EF4-FFF2-40B4-BE49-F238E27FC236}">
-                <a16:creationId xmlns:a16="http://schemas.microsoft.com/office/drawing/2014/main" id="{7957D0C6-880B-34C1-73AA-F9B8767113B8}"/>
-              </a:ext>
-            </a:extLst>
-          </p:cNvPr>
+            <a:endParaRPr lang="en-US" dirty="0"/>
+          </a:p>
+        </p:txBody>
+      </p:sp>
+      <p:sp>
+        <p:nvSpPr>
+          <p:cNvPr id="4" name="Date Placeholder 3"/>
           <p:cNvSpPr>
             <a:spLocks noGrp="1"/>
           </p:cNvSpPr>
@@ -454,9 +422,9 @@
           <a:bodyPr/>
           <a:lstStyle/>
           <a:p>
-            <a:fld id="{4BA8C318-080F-194F-AFAE-76709D53A411}" type="datetimeFigureOut">
+            <a:fld id="{5D5EEEB1-9457-F541-8E93-E8346267924A}" type="datetimeFigureOut">
               <a:rPr lang="en-DE" smtClean="0"/>
-              <a:t>19.04.22</a:t>
+              <a:t>10.05.22</a:t>
             </a:fld>
             <a:endParaRPr lang="en-DE"/>
           </a:p>
@@ -464,13 +432,7 @@
       </p:sp>
       <p:sp>
         <p:nvSpPr>
-          <p:cNvPr id="5" name="Footer Placeholder 4">
-            <a:extLst>
-              <a:ext uri="{FF2B5EF4-FFF2-40B4-BE49-F238E27FC236}">
-                <a16:creationId xmlns:a16="http://schemas.microsoft.com/office/drawing/2014/main" id="{D17B5219-1731-3324-4281-DE6689DF7C7E}"/>
-              </a:ext>
-            </a:extLst>
-          </p:cNvPr>
+          <p:cNvPr id="5" name="Footer Placeholder 4"/>
           <p:cNvSpPr>
             <a:spLocks noGrp="1"/>
           </p:cNvSpPr>
@@ -489,13 +451,7 @@
       </p:sp>
       <p:sp>
         <p:nvSpPr>
-          <p:cNvPr id="6" name="Slide Number Placeholder 5">
-            <a:extLst>
-              <a:ext uri="{FF2B5EF4-FFF2-40B4-BE49-F238E27FC236}">
-                <a16:creationId xmlns:a16="http://schemas.microsoft.com/office/drawing/2014/main" id="{008A7630-A622-0DB9-5AD5-C93C89CCF17C}"/>
-              </a:ext>
-            </a:extLst>
-          </p:cNvPr>
+          <p:cNvPr id="6" name="Slide Number Placeholder 5"/>
           <p:cNvSpPr>
             <a:spLocks noGrp="1"/>
           </p:cNvSpPr>
@@ -508,7 +464,7 @@
           <a:bodyPr/>
           <a:lstStyle/>
           <a:p>
-            <a:fld id="{3E641AC2-74A6-0B45-AA7A-FDD9099B35B0}" type="slidenum">
+            <a:fld id="{AD889EE7-EA20-7649-8640-1575DCB12BE0}" type="slidenum">
               <a:rPr lang="en-DE" smtClean="0"/>
               <a:t>‹#›</a:t>
             </a:fld>
@@ -519,7 +475,7 @@
     </p:spTree>
     <p:extLst>
       <p:ext uri="{BB962C8B-B14F-4D97-AF65-F5344CB8AC3E}">
-        <p14:creationId xmlns:p14="http://schemas.microsoft.com/office/powerpoint/2010/main" val="465963636"/>
+        <p14:creationId xmlns:p14="http://schemas.microsoft.com/office/powerpoint/2010/main" val="879467276"/>
       </p:ext>
     </p:extLst>
   </p:cSld>
@@ -548,13 +504,7 @@
       </p:grpSpPr>
       <p:sp>
         <p:nvSpPr>
-          <p:cNvPr id="2" name="Vertical Title 1">
-            <a:extLst>
-              <a:ext uri="{FF2B5EF4-FFF2-40B4-BE49-F238E27FC236}">
-                <a16:creationId xmlns:a16="http://schemas.microsoft.com/office/drawing/2014/main" id="{F3847480-2217-30DA-BBAD-835102735821}"/>
-              </a:ext>
-            </a:extLst>
-          </p:cNvPr>
+          <p:cNvPr id="2" name="Vertical Title 1"/>
           <p:cNvSpPr>
             <a:spLocks noGrp="1"/>
           </p:cNvSpPr>
@@ -564,8 +514,8 @@
         </p:nvSpPr>
         <p:spPr>
           <a:xfrm>
-            <a:off x="8724900" y="365125"/>
-            <a:ext cx="2628900" cy="5811838"/>
+            <a:off x="8501098" y="346953"/>
+            <a:ext cx="2561466" cy="5522592"/>
           </a:xfrm>
         </p:spPr>
         <p:txBody>
@@ -576,19 +526,13 @@
               <a:rPr lang="en-GB"/>
               <a:t>Click to edit Master title style</a:t>
             </a:r>
-            <a:endParaRPr lang="en-DE"/>
-          </a:p>
-        </p:txBody>
-      </p:sp>
-      <p:sp>
-        <p:nvSpPr>
-          <p:cNvPr id="3" name="Vertical Text Placeholder 2">
-            <a:extLst>
-              <a:ext uri="{FF2B5EF4-FFF2-40B4-BE49-F238E27FC236}">
-                <a16:creationId xmlns:a16="http://schemas.microsoft.com/office/drawing/2014/main" id="{02B8AE38-D953-4506-FB67-3D185F4C90FA}"/>
-              </a:ext>
-            </a:extLst>
-          </p:cNvPr>
+            <a:endParaRPr lang="en-US" dirty="0"/>
+          </a:p>
+        </p:txBody>
+      </p:sp>
+      <p:sp>
+        <p:nvSpPr>
+          <p:cNvPr id="3" name="Vertical Text Placeholder 2"/>
           <p:cNvSpPr>
             <a:spLocks noGrp="1"/>
           </p:cNvSpPr>
@@ -598,8 +542,8 @@
         </p:nvSpPr>
         <p:spPr>
           <a:xfrm>
-            <a:off x="838200" y="365125"/>
-            <a:ext cx="7734300" cy="5811838"/>
+            <a:off x="816700" y="346953"/>
+            <a:ext cx="7535907" cy="5522592"/>
           </a:xfrm>
         </p:spPr>
         <p:txBody>
@@ -639,19 +583,13 @@
               <a:rPr lang="en-GB"/>
               <a:t>Fifth level</a:t>
             </a:r>
-            <a:endParaRPr lang="en-DE"/>
-          </a:p>
-        </p:txBody>
-      </p:sp>
-      <p:sp>
-        <p:nvSpPr>
-          <p:cNvPr id="4" name="Date Placeholder 3">
-            <a:extLst>
-              <a:ext uri="{FF2B5EF4-FFF2-40B4-BE49-F238E27FC236}">
-                <a16:creationId xmlns:a16="http://schemas.microsoft.com/office/drawing/2014/main" id="{FED7C28B-C0C8-28DC-119D-FA8EB0A814C6}"/>
-              </a:ext>
-            </a:extLst>
-          </p:cNvPr>
+            <a:endParaRPr lang="en-US" dirty="0"/>
+          </a:p>
+        </p:txBody>
+      </p:sp>
+      <p:sp>
+        <p:nvSpPr>
+          <p:cNvPr id="4" name="Date Placeholder 3"/>
           <p:cNvSpPr>
             <a:spLocks noGrp="1"/>
           </p:cNvSpPr>
@@ -664,9 +602,9 @@
           <a:bodyPr/>
           <a:lstStyle/>
           <a:p>
-            <a:fld id="{4BA8C318-080F-194F-AFAE-76709D53A411}" type="datetimeFigureOut">
+            <a:fld id="{5D5EEEB1-9457-F541-8E93-E8346267924A}" type="datetimeFigureOut">
               <a:rPr lang="en-DE" smtClean="0"/>
-              <a:t>19.04.22</a:t>
+              <a:t>10.05.22</a:t>
             </a:fld>
             <a:endParaRPr lang="en-DE"/>
           </a:p>
@@ -674,13 +612,7 @@
       </p:sp>
       <p:sp>
         <p:nvSpPr>
-          <p:cNvPr id="5" name="Footer Placeholder 4">
-            <a:extLst>
-              <a:ext uri="{FF2B5EF4-FFF2-40B4-BE49-F238E27FC236}">
-                <a16:creationId xmlns:a16="http://schemas.microsoft.com/office/drawing/2014/main" id="{2F53FE70-3CA2-52DA-0EE6-B2AE62C00109}"/>
-              </a:ext>
-            </a:extLst>
-          </p:cNvPr>
+          <p:cNvPr id="5" name="Footer Placeholder 4"/>
           <p:cNvSpPr>
             <a:spLocks noGrp="1"/>
           </p:cNvSpPr>
@@ -699,13 +631,7 @@
       </p:sp>
       <p:sp>
         <p:nvSpPr>
-          <p:cNvPr id="6" name="Slide Number Placeholder 5">
-            <a:extLst>
-              <a:ext uri="{FF2B5EF4-FFF2-40B4-BE49-F238E27FC236}">
-                <a16:creationId xmlns:a16="http://schemas.microsoft.com/office/drawing/2014/main" id="{2F52EA8A-574B-EDBD-93F9-489C6E64A9FC}"/>
-              </a:ext>
-            </a:extLst>
-          </p:cNvPr>
+          <p:cNvPr id="6" name="Slide Number Placeholder 5"/>
           <p:cNvSpPr>
             <a:spLocks noGrp="1"/>
           </p:cNvSpPr>
@@ -718,7 +644,7 @@
           <a:bodyPr/>
           <a:lstStyle/>
           <a:p>
-            <a:fld id="{3E641AC2-74A6-0B45-AA7A-FDD9099B35B0}" type="slidenum">
+            <a:fld id="{AD889EE7-EA20-7649-8640-1575DCB12BE0}" type="slidenum">
               <a:rPr lang="en-DE" smtClean="0"/>
               <a:t>‹#›</a:t>
             </a:fld>
@@ -729,7 +655,7 @@
     </p:spTree>
     <p:extLst>
       <p:ext uri="{BB962C8B-B14F-4D97-AF65-F5344CB8AC3E}">
-        <p14:creationId xmlns:p14="http://schemas.microsoft.com/office/powerpoint/2010/main" val="1304409645"/>
+        <p14:creationId xmlns:p14="http://schemas.microsoft.com/office/powerpoint/2010/main" val="354239831"/>
       </p:ext>
     </p:extLst>
   </p:cSld>
@@ -758,13 +684,7 @@
       </p:grpSpPr>
       <p:sp>
         <p:nvSpPr>
-          <p:cNvPr id="2" name="Title 1">
-            <a:extLst>
-              <a:ext uri="{FF2B5EF4-FFF2-40B4-BE49-F238E27FC236}">
-                <a16:creationId xmlns:a16="http://schemas.microsoft.com/office/drawing/2014/main" id="{87E9A23D-D1D5-FE49-3BE1-2F2E60E0AE3D}"/>
-              </a:ext>
-            </a:extLst>
-          </p:cNvPr>
+          <p:cNvPr id="2" name="Title 1"/>
           <p:cNvSpPr>
             <a:spLocks noGrp="1"/>
           </p:cNvSpPr>
@@ -781,19 +701,13 @@
               <a:rPr lang="en-GB"/>
               <a:t>Click to edit Master title style</a:t>
             </a:r>
-            <a:endParaRPr lang="en-DE"/>
-          </a:p>
-        </p:txBody>
-      </p:sp>
-      <p:sp>
-        <p:nvSpPr>
-          <p:cNvPr id="3" name="Content Placeholder 2">
-            <a:extLst>
-              <a:ext uri="{FF2B5EF4-FFF2-40B4-BE49-F238E27FC236}">
-                <a16:creationId xmlns:a16="http://schemas.microsoft.com/office/drawing/2014/main" id="{43D29A54-2CE5-9D9C-E974-F5EFAD1E502A}"/>
-              </a:ext>
-            </a:extLst>
-          </p:cNvPr>
+            <a:endParaRPr lang="en-US" dirty="0"/>
+          </a:p>
+        </p:txBody>
+      </p:sp>
+      <p:sp>
+        <p:nvSpPr>
+          <p:cNvPr id="3" name="Content Placeholder 2"/>
           <p:cNvSpPr>
             <a:spLocks noGrp="1"/>
           </p:cNvSpPr>
@@ -839,19 +753,13 @@
               <a:rPr lang="en-GB"/>
               <a:t>Fifth level</a:t>
             </a:r>
-            <a:endParaRPr lang="en-DE"/>
-          </a:p>
-        </p:txBody>
-      </p:sp>
-      <p:sp>
-        <p:nvSpPr>
-          <p:cNvPr id="4" name="Date Placeholder 3">
-            <a:extLst>
-              <a:ext uri="{FF2B5EF4-FFF2-40B4-BE49-F238E27FC236}">
-                <a16:creationId xmlns:a16="http://schemas.microsoft.com/office/drawing/2014/main" id="{7432619B-0FDE-BEC2-63FC-D021690821C8}"/>
-              </a:ext>
-            </a:extLst>
-          </p:cNvPr>
+            <a:endParaRPr lang="en-US" dirty="0"/>
+          </a:p>
+        </p:txBody>
+      </p:sp>
+      <p:sp>
+        <p:nvSpPr>
+          <p:cNvPr id="4" name="Date Placeholder 3"/>
           <p:cNvSpPr>
             <a:spLocks noGrp="1"/>
           </p:cNvSpPr>
@@ -864,9 +772,9 @@
           <a:bodyPr/>
           <a:lstStyle/>
           <a:p>
-            <a:fld id="{4BA8C318-080F-194F-AFAE-76709D53A411}" type="datetimeFigureOut">
+            <a:fld id="{5D5EEEB1-9457-F541-8E93-E8346267924A}" type="datetimeFigureOut">
               <a:rPr lang="en-DE" smtClean="0"/>
-              <a:t>19.04.22</a:t>
+              <a:t>10.05.22</a:t>
             </a:fld>
             <a:endParaRPr lang="en-DE"/>
           </a:p>
@@ -874,13 +782,7 @@
       </p:sp>
       <p:sp>
         <p:nvSpPr>
-          <p:cNvPr id="5" name="Footer Placeholder 4">
-            <a:extLst>
-              <a:ext uri="{FF2B5EF4-FFF2-40B4-BE49-F238E27FC236}">
-                <a16:creationId xmlns:a16="http://schemas.microsoft.com/office/drawing/2014/main" id="{3BBB3A51-0B1C-465D-9FFD-45205F0DF812}"/>
-              </a:ext>
-            </a:extLst>
-          </p:cNvPr>
+          <p:cNvPr id="5" name="Footer Placeholder 4"/>
           <p:cNvSpPr>
             <a:spLocks noGrp="1"/>
           </p:cNvSpPr>
@@ -899,13 +801,7 @@
       </p:sp>
       <p:sp>
         <p:nvSpPr>
-          <p:cNvPr id="6" name="Slide Number Placeholder 5">
-            <a:extLst>
-              <a:ext uri="{FF2B5EF4-FFF2-40B4-BE49-F238E27FC236}">
-                <a16:creationId xmlns:a16="http://schemas.microsoft.com/office/drawing/2014/main" id="{D8A6C1BA-4812-1F80-2526-CF0380EBABF0}"/>
-              </a:ext>
-            </a:extLst>
-          </p:cNvPr>
+          <p:cNvPr id="6" name="Slide Number Placeholder 5"/>
           <p:cNvSpPr>
             <a:spLocks noGrp="1"/>
           </p:cNvSpPr>
@@ -918,7 +814,7 @@
           <a:bodyPr/>
           <a:lstStyle/>
           <a:p>
-            <a:fld id="{3E641AC2-74A6-0B45-AA7A-FDD9099B35B0}" type="slidenum">
+            <a:fld id="{AD889EE7-EA20-7649-8640-1575DCB12BE0}" type="slidenum">
               <a:rPr lang="en-DE" smtClean="0"/>
               <a:t>‹#›</a:t>
             </a:fld>
@@ -929,7 +825,7 @@
     </p:spTree>
     <p:extLst>
       <p:ext uri="{BB962C8B-B14F-4D97-AF65-F5344CB8AC3E}">
-        <p14:creationId xmlns:p14="http://schemas.microsoft.com/office/powerpoint/2010/main" val="547196743"/>
+        <p14:creationId xmlns:p14="http://schemas.microsoft.com/office/powerpoint/2010/main" val="3446594965"/>
       </p:ext>
     </p:extLst>
   </p:cSld>
@@ -958,13 +854,7 @@
       </p:grpSpPr>
       <p:sp>
         <p:nvSpPr>
-          <p:cNvPr id="2" name="Title 1">
-            <a:extLst>
-              <a:ext uri="{FF2B5EF4-FFF2-40B4-BE49-F238E27FC236}">
-                <a16:creationId xmlns:a16="http://schemas.microsoft.com/office/drawing/2014/main" id="{5B3FEBA3-79FA-67C4-77DE-822853E3424C}"/>
-              </a:ext>
-            </a:extLst>
-          </p:cNvPr>
+          <p:cNvPr id="2" name="Title 1"/>
           <p:cNvSpPr>
             <a:spLocks noGrp="1"/>
           </p:cNvSpPr>
@@ -974,15 +864,15 @@
         </p:nvSpPr>
         <p:spPr>
           <a:xfrm>
-            <a:off x="831850" y="1709738"/>
-            <a:ext cx="10515600" cy="2852737"/>
+            <a:off x="810512" y="1624647"/>
+            <a:ext cx="10245864" cy="2710761"/>
           </a:xfrm>
         </p:spPr>
         <p:txBody>
           <a:bodyPr anchor="b"/>
           <a:lstStyle>
             <a:lvl1pPr>
-              <a:defRPr sz="6000"/>
+              <a:defRPr sz="5701"/>
             </a:lvl1pPr>
           </a:lstStyle>
           <a:p>
@@ -990,19 +880,13 @@
               <a:rPr lang="en-GB"/>
               <a:t>Click to edit Master title style</a:t>
             </a:r>
-            <a:endParaRPr lang="en-DE"/>
-          </a:p>
-        </p:txBody>
-      </p:sp>
-      <p:sp>
-        <p:nvSpPr>
-          <p:cNvPr id="3" name="Text Placeholder 2">
-            <a:extLst>
-              <a:ext uri="{FF2B5EF4-FFF2-40B4-BE49-F238E27FC236}">
-                <a16:creationId xmlns:a16="http://schemas.microsoft.com/office/drawing/2014/main" id="{9C5E34C3-F059-D83E-27CA-6D0FF69CF5C3}"/>
-              </a:ext>
-            </a:extLst>
-          </p:cNvPr>
+            <a:endParaRPr lang="en-US" dirty="0"/>
+          </a:p>
+        </p:txBody>
+      </p:sp>
+      <p:sp>
+        <p:nvSpPr>
+          <p:cNvPr id="3" name="Text Placeholder 2"/>
           <p:cNvSpPr>
             <a:spLocks noGrp="1"/>
           </p:cNvSpPr>
@@ -1012,8 +896,8 @@
         </p:nvSpPr>
         <p:spPr>
           <a:xfrm>
-            <a:off x="831850" y="4589463"/>
-            <a:ext cx="10515600" cy="1500187"/>
+            <a:off x="810512" y="4361053"/>
+            <a:ext cx="10245864" cy="1425525"/>
           </a:xfrm>
         </p:spPr>
         <p:txBody>
@@ -1021,7 +905,7 @@
           <a:lstStyle>
             <a:lvl1pPr marL="0" indent="0">
               <a:buNone/>
-              <a:defRPr sz="2400">
+              <a:defRPr sz="2280">
                 <a:solidFill>
                   <a:schemeClr val="tx1">
                     <a:tint val="75000"/>
@@ -1029,9 +913,9 @@
                 </a:solidFill>
               </a:defRPr>
             </a:lvl1pPr>
-            <a:lvl2pPr marL="457200" indent="0">
-              <a:buNone/>
-              <a:defRPr sz="2000">
+            <a:lvl2pPr marL="434431" indent="0">
+              <a:buNone/>
+              <a:defRPr sz="1900">
                 <a:solidFill>
                   <a:schemeClr val="tx1">
                     <a:tint val="75000"/>
@@ -1039,9 +923,9 @@
                 </a:solidFill>
               </a:defRPr>
             </a:lvl2pPr>
-            <a:lvl3pPr marL="914400" indent="0">
-              <a:buNone/>
-              <a:defRPr sz="1800">
+            <a:lvl3pPr marL="868863" indent="0">
+              <a:buNone/>
+              <a:defRPr sz="1710">
                 <a:solidFill>
                   <a:schemeClr val="tx1">
                     <a:tint val="75000"/>
@@ -1049,9 +933,9 @@
                 </a:solidFill>
               </a:defRPr>
             </a:lvl3pPr>
-            <a:lvl4pPr marL="1371600" indent="0">
-              <a:buNone/>
-              <a:defRPr sz="1600">
+            <a:lvl4pPr marL="1303294" indent="0">
+              <a:buNone/>
+              <a:defRPr sz="1520">
                 <a:solidFill>
                   <a:schemeClr val="tx1">
                     <a:tint val="75000"/>
@@ -1059,9 +943,9 @@
                 </a:solidFill>
               </a:defRPr>
             </a:lvl4pPr>
-            <a:lvl5pPr marL="1828800" indent="0">
-              <a:buNone/>
-              <a:defRPr sz="1600">
+            <a:lvl5pPr marL="1737726" indent="0">
+              <a:buNone/>
+              <a:defRPr sz="1520">
                 <a:solidFill>
                   <a:schemeClr val="tx1">
                     <a:tint val="75000"/>
@@ -1069,9 +953,9 @@
                 </a:solidFill>
               </a:defRPr>
             </a:lvl5pPr>
-            <a:lvl6pPr marL="2286000" indent="0">
-              <a:buNone/>
-              <a:defRPr sz="1600">
+            <a:lvl6pPr marL="2172157" indent="0">
+              <a:buNone/>
+              <a:defRPr sz="1520">
                 <a:solidFill>
                   <a:schemeClr val="tx1">
                     <a:tint val="75000"/>
@@ -1079,9 +963,9 @@
                 </a:solidFill>
               </a:defRPr>
             </a:lvl6pPr>
-            <a:lvl7pPr marL="2743200" indent="0">
-              <a:buNone/>
-              <a:defRPr sz="1600">
+            <a:lvl7pPr marL="2606589" indent="0">
+              <a:buNone/>
+              <a:defRPr sz="1520">
                 <a:solidFill>
                   <a:schemeClr val="tx1">
                     <a:tint val="75000"/>
@@ -1089,9 +973,9 @@
                 </a:solidFill>
               </a:defRPr>
             </a:lvl7pPr>
-            <a:lvl8pPr marL="3200400" indent="0">
-              <a:buNone/>
-              <a:defRPr sz="1600">
+            <a:lvl8pPr marL="3041020" indent="0">
+              <a:buNone/>
+              <a:defRPr sz="1520">
                 <a:solidFill>
                   <a:schemeClr val="tx1">
                     <a:tint val="75000"/>
@@ -1099,9 +983,9 @@
                 </a:solidFill>
               </a:defRPr>
             </a:lvl8pPr>
-            <a:lvl9pPr marL="3657600" indent="0">
-              <a:buNone/>
-              <a:defRPr sz="1600">
+            <a:lvl9pPr marL="3475452" indent="0">
+              <a:buNone/>
+              <a:defRPr sz="1520">
                 <a:solidFill>
                   <a:schemeClr val="tx1">
                     <a:tint val="75000"/>
@@ -1121,13 +1005,7 @@
       </p:sp>
       <p:sp>
         <p:nvSpPr>
-          <p:cNvPr id="4" name="Date Placeholder 3">
-            <a:extLst>
-              <a:ext uri="{FF2B5EF4-FFF2-40B4-BE49-F238E27FC236}">
-                <a16:creationId xmlns:a16="http://schemas.microsoft.com/office/drawing/2014/main" id="{DB5537BE-DE32-EA64-36E0-272BE4F24F86}"/>
-              </a:ext>
-            </a:extLst>
-          </p:cNvPr>
+          <p:cNvPr id="4" name="Date Placeholder 3"/>
           <p:cNvSpPr>
             <a:spLocks noGrp="1"/>
           </p:cNvSpPr>
@@ -1140,9 +1018,9 @@
           <a:bodyPr/>
           <a:lstStyle/>
           <a:p>
-            <a:fld id="{4BA8C318-080F-194F-AFAE-76709D53A411}" type="datetimeFigureOut">
+            <a:fld id="{5D5EEEB1-9457-F541-8E93-E8346267924A}" type="datetimeFigureOut">
               <a:rPr lang="en-DE" smtClean="0"/>
-              <a:t>19.04.22</a:t>
+              <a:t>10.05.22</a:t>
             </a:fld>
             <a:endParaRPr lang="en-DE"/>
           </a:p>
@@ -1150,13 +1028,7 @@
       </p:sp>
       <p:sp>
         <p:nvSpPr>
-          <p:cNvPr id="5" name="Footer Placeholder 4">
-            <a:extLst>
-              <a:ext uri="{FF2B5EF4-FFF2-40B4-BE49-F238E27FC236}">
-                <a16:creationId xmlns:a16="http://schemas.microsoft.com/office/drawing/2014/main" id="{B6B4C8DC-06B2-9CDD-EE6C-4B30E1F6FCAC}"/>
-              </a:ext>
-            </a:extLst>
-          </p:cNvPr>
+          <p:cNvPr id="5" name="Footer Placeholder 4"/>
           <p:cNvSpPr>
             <a:spLocks noGrp="1"/>
           </p:cNvSpPr>
@@ -1175,13 +1047,7 @@
       </p:sp>
       <p:sp>
         <p:nvSpPr>
-          <p:cNvPr id="6" name="Slide Number Placeholder 5">
-            <a:extLst>
-              <a:ext uri="{FF2B5EF4-FFF2-40B4-BE49-F238E27FC236}">
-                <a16:creationId xmlns:a16="http://schemas.microsoft.com/office/drawing/2014/main" id="{9D8DEBD6-E2EB-2181-AFAF-0C51C961F2C0}"/>
-              </a:ext>
-            </a:extLst>
-          </p:cNvPr>
+          <p:cNvPr id="6" name="Slide Number Placeholder 5"/>
           <p:cNvSpPr>
             <a:spLocks noGrp="1"/>
           </p:cNvSpPr>
@@ -1194,7 +1060,7 @@
           <a:bodyPr/>
           <a:lstStyle/>
           <a:p>
-            <a:fld id="{3E641AC2-74A6-0B45-AA7A-FDD9099B35B0}" type="slidenum">
+            <a:fld id="{AD889EE7-EA20-7649-8640-1575DCB12BE0}" type="slidenum">
               <a:rPr lang="en-DE" smtClean="0"/>
               <a:t>‹#›</a:t>
             </a:fld>
@@ -1205,7 +1071,7 @@
     </p:spTree>
     <p:extLst>
       <p:ext uri="{BB962C8B-B14F-4D97-AF65-F5344CB8AC3E}">
-        <p14:creationId xmlns:p14="http://schemas.microsoft.com/office/powerpoint/2010/main" val="3442251242"/>
+        <p14:creationId xmlns:p14="http://schemas.microsoft.com/office/powerpoint/2010/main" val="2718643315"/>
       </p:ext>
     </p:extLst>
   </p:cSld>
@@ -1234,13 +1100,7 @@
       </p:grpSpPr>
       <p:sp>
         <p:nvSpPr>
-          <p:cNvPr id="2" name="Title 1">
-            <a:extLst>
-              <a:ext uri="{FF2B5EF4-FFF2-40B4-BE49-F238E27FC236}">
-                <a16:creationId xmlns:a16="http://schemas.microsoft.com/office/drawing/2014/main" id="{845D07AC-C64A-4154-CA1C-0375169A8154}"/>
-              </a:ext>
-            </a:extLst>
-          </p:cNvPr>
+          <p:cNvPr id="2" name="Title 1"/>
           <p:cNvSpPr>
             <a:spLocks noGrp="1"/>
           </p:cNvSpPr>
@@ -1257,19 +1117,13 @@
               <a:rPr lang="en-GB"/>
               <a:t>Click to edit Master title style</a:t>
             </a:r>
-            <a:endParaRPr lang="en-DE"/>
-          </a:p>
-        </p:txBody>
-      </p:sp>
-      <p:sp>
-        <p:nvSpPr>
-          <p:cNvPr id="3" name="Content Placeholder 2">
-            <a:extLst>
-              <a:ext uri="{FF2B5EF4-FFF2-40B4-BE49-F238E27FC236}">
-                <a16:creationId xmlns:a16="http://schemas.microsoft.com/office/drawing/2014/main" id="{678D4F3C-DA90-DBA9-D6E6-8444C73CB257}"/>
-              </a:ext>
-            </a:extLst>
-          </p:cNvPr>
+            <a:endParaRPr lang="en-US" dirty="0"/>
+          </a:p>
+        </p:txBody>
+      </p:sp>
+      <p:sp>
+        <p:nvSpPr>
+          <p:cNvPr id="3" name="Content Placeholder 2"/>
           <p:cNvSpPr>
             <a:spLocks noGrp="1"/>
           </p:cNvSpPr>
@@ -1279,8 +1133,8 @@
         </p:nvSpPr>
         <p:spPr>
           <a:xfrm>
-            <a:off x="838200" y="1825625"/>
-            <a:ext cx="5181600" cy="4351338"/>
+            <a:off x="816699" y="1734766"/>
+            <a:ext cx="5048687" cy="4134779"/>
           </a:xfrm>
         </p:spPr>
         <p:txBody>
@@ -1320,19 +1174,13 @@
               <a:rPr lang="en-GB"/>
               <a:t>Fifth level</a:t>
             </a:r>
-            <a:endParaRPr lang="en-DE"/>
-          </a:p>
-        </p:txBody>
-      </p:sp>
-      <p:sp>
-        <p:nvSpPr>
-          <p:cNvPr id="4" name="Content Placeholder 3">
-            <a:extLst>
-              <a:ext uri="{FF2B5EF4-FFF2-40B4-BE49-F238E27FC236}">
-                <a16:creationId xmlns:a16="http://schemas.microsoft.com/office/drawing/2014/main" id="{5EB930CB-A8D1-8A86-5D22-FB7E7691106C}"/>
-              </a:ext>
-            </a:extLst>
-          </p:cNvPr>
+            <a:endParaRPr lang="en-US" dirty="0"/>
+          </a:p>
+        </p:txBody>
+      </p:sp>
+      <p:sp>
+        <p:nvSpPr>
+          <p:cNvPr id="4" name="Content Placeholder 3"/>
           <p:cNvSpPr>
             <a:spLocks noGrp="1"/>
           </p:cNvSpPr>
@@ -1342,8 +1190,8 @@
         </p:nvSpPr>
         <p:spPr>
           <a:xfrm>
-            <a:off x="6172200" y="1825625"/>
-            <a:ext cx="5181600" cy="4351338"/>
+            <a:off x="6013877" y="1734766"/>
+            <a:ext cx="5048687" cy="4134779"/>
           </a:xfrm>
         </p:spPr>
         <p:txBody>
@@ -1383,19 +1231,13 @@
               <a:rPr lang="en-GB"/>
               <a:t>Fifth level</a:t>
             </a:r>
-            <a:endParaRPr lang="en-DE"/>
-          </a:p>
-        </p:txBody>
-      </p:sp>
-      <p:sp>
-        <p:nvSpPr>
-          <p:cNvPr id="5" name="Date Placeholder 4">
-            <a:extLst>
-              <a:ext uri="{FF2B5EF4-FFF2-40B4-BE49-F238E27FC236}">
-                <a16:creationId xmlns:a16="http://schemas.microsoft.com/office/drawing/2014/main" id="{F881C962-FA59-696B-51A4-C9DBDC8D12A2}"/>
-              </a:ext>
-            </a:extLst>
-          </p:cNvPr>
+            <a:endParaRPr lang="en-US" dirty="0"/>
+          </a:p>
+        </p:txBody>
+      </p:sp>
+      <p:sp>
+        <p:nvSpPr>
+          <p:cNvPr id="5" name="Date Placeholder 4"/>
           <p:cNvSpPr>
             <a:spLocks noGrp="1"/>
           </p:cNvSpPr>
@@ -1408,9 +1250,9 @@
           <a:bodyPr/>
           <a:lstStyle/>
           <a:p>
-            <a:fld id="{4BA8C318-080F-194F-AFAE-76709D53A411}" type="datetimeFigureOut">
+            <a:fld id="{5D5EEEB1-9457-F541-8E93-E8346267924A}" type="datetimeFigureOut">
               <a:rPr lang="en-DE" smtClean="0"/>
-              <a:t>19.04.22</a:t>
+              <a:t>10.05.22</a:t>
             </a:fld>
             <a:endParaRPr lang="en-DE"/>
           </a:p>
@@ -1418,13 +1260,7 @@
       </p:sp>
       <p:sp>
         <p:nvSpPr>
-          <p:cNvPr id="6" name="Footer Placeholder 5">
-            <a:extLst>
-              <a:ext uri="{FF2B5EF4-FFF2-40B4-BE49-F238E27FC236}">
-                <a16:creationId xmlns:a16="http://schemas.microsoft.com/office/drawing/2014/main" id="{46286599-4BE2-651D-F065-32C3D62A9D40}"/>
-              </a:ext>
-            </a:extLst>
-          </p:cNvPr>
+          <p:cNvPr id="6" name="Footer Placeholder 5"/>
           <p:cNvSpPr>
             <a:spLocks noGrp="1"/>
           </p:cNvSpPr>
@@ -1443,13 +1279,7 @@
       </p:sp>
       <p:sp>
         <p:nvSpPr>
-          <p:cNvPr id="7" name="Slide Number Placeholder 6">
-            <a:extLst>
-              <a:ext uri="{FF2B5EF4-FFF2-40B4-BE49-F238E27FC236}">
-                <a16:creationId xmlns:a16="http://schemas.microsoft.com/office/drawing/2014/main" id="{7CA5B759-2B33-58DF-E98E-F3307811740A}"/>
-              </a:ext>
-            </a:extLst>
-          </p:cNvPr>
+          <p:cNvPr id="7" name="Slide Number Placeholder 6"/>
           <p:cNvSpPr>
             <a:spLocks noGrp="1"/>
           </p:cNvSpPr>
@@ -1462,7 +1292,7 @@
           <a:bodyPr/>
           <a:lstStyle/>
           <a:p>
-            <a:fld id="{3E641AC2-74A6-0B45-AA7A-FDD9099B35B0}" type="slidenum">
+            <a:fld id="{AD889EE7-EA20-7649-8640-1575DCB12BE0}" type="slidenum">
               <a:rPr lang="en-DE" smtClean="0"/>
               <a:t>‹#›</a:t>
             </a:fld>
@@ -1473,7 +1303,7 @@
     </p:spTree>
     <p:extLst>
       <p:ext uri="{BB962C8B-B14F-4D97-AF65-F5344CB8AC3E}">
-        <p14:creationId xmlns:p14="http://schemas.microsoft.com/office/powerpoint/2010/main" val="921653054"/>
+        <p14:creationId xmlns:p14="http://schemas.microsoft.com/office/powerpoint/2010/main" val="3078143749"/>
       </p:ext>
     </p:extLst>
   </p:cSld>
@@ -1502,13 +1332,7 @@
       </p:grpSpPr>
       <p:sp>
         <p:nvSpPr>
-          <p:cNvPr id="2" name="Title 1">
-            <a:extLst>
-              <a:ext uri="{FF2B5EF4-FFF2-40B4-BE49-F238E27FC236}">
-                <a16:creationId xmlns:a16="http://schemas.microsoft.com/office/drawing/2014/main" id="{AD22D312-B56E-5D23-70E4-0BC3C6FB7DF7}"/>
-              </a:ext>
-            </a:extLst>
-          </p:cNvPr>
+          <p:cNvPr id="2" name="Title 1"/>
           <p:cNvSpPr>
             <a:spLocks noGrp="1"/>
           </p:cNvSpPr>
@@ -1518,8 +1342,8 @@
         </p:nvSpPr>
         <p:spPr>
           <a:xfrm>
-            <a:off x="839788" y="365125"/>
-            <a:ext cx="10515600" cy="1325563"/>
+            <a:off x="818247" y="346954"/>
+            <a:ext cx="10245864" cy="1259592"/>
           </a:xfrm>
         </p:spPr>
         <p:txBody>
@@ -1530,19 +1354,13 @@
               <a:rPr lang="en-GB"/>
               <a:t>Click to edit Master title style</a:t>
             </a:r>
-            <a:endParaRPr lang="en-DE"/>
-          </a:p>
-        </p:txBody>
-      </p:sp>
-      <p:sp>
-        <p:nvSpPr>
-          <p:cNvPr id="3" name="Text Placeholder 2">
-            <a:extLst>
-              <a:ext uri="{FF2B5EF4-FFF2-40B4-BE49-F238E27FC236}">
-                <a16:creationId xmlns:a16="http://schemas.microsoft.com/office/drawing/2014/main" id="{D5BE7E86-3937-4AA8-5054-2EE841BB07A8}"/>
-              </a:ext>
-            </a:extLst>
-          </p:cNvPr>
+            <a:endParaRPr lang="en-US" dirty="0"/>
+          </a:p>
+        </p:txBody>
+      </p:sp>
+      <p:sp>
+        <p:nvSpPr>
+          <p:cNvPr id="3" name="Text Placeholder 2"/>
           <p:cNvSpPr>
             <a:spLocks noGrp="1"/>
           </p:cNvSpPr>
@@ -1552,8 +1370,8 @@
         </p:nvSpPr>
         <p:spPr>
           <a:xfrm>
-            <a:off x="839788" y="1681163"/>
-            <a:ext cx="5157787" cy="823912"/>
+            <a:off x="818247" y="1597494"/>
+            <a:ext cx="5025485" cy="782907"/>
           </a:xfrm>
         </p:spPr>
         <p:txBody>
@@ -1561,39 +1379,39 @@
           <a:lstStyle>
             <a:lvl1pPr marL="0" indent="0">
               <a:buNone/>
-              <a:defRPr sz="2400" b="1"/>
+              <a:defRPr sz="2280" b="1"/>
             </a:lvl1pPr>
-            <a:lvl2pPr marL="457200" indent="0">
-              <a:buNone/>
-              <a:defRPr sz="2000" b="1"/>
+            <a:lvl2pPr marL="434431" indent="0">
+              <a:buNone/>
+              <a:defRPr sz="1900" b="1"/>
             </a:lvl2pPr>
-            <a:lvl3pPr marL="914400" indent="0">
-              <a:buNone/>
-              <a:defRPr sz="1800" b="1"/>
+            <a:lvl3pPr marL="868863" indent="0">
+              <a:buNone/>
+              <a:defRPr sz="1710" b="1"/>
             </a:lvl3pPr>
-            <a:lvl4pPr marL="1371600" indent="0">
-              <a:buNone/>
-              <a:defRPr sz="1600" b="1"/>
+            <a:lvl4pPr marL="1303294" indent="0">
+              <a:buNone/>
+              <a:defRPr sz="1520" b="1"/>
             </a:lvl4pPr>
-            <a:lvl5pPr marL="1828800" indent="0">
-              <a:buNone/>
-              <a:defRPr sz="1600" b="1"/>
+            <a:lvl5pPr marL="1737726" indent="0">
+              <a:buNone/>
+              <a:defRPr sz="1520" b="1"/>
             </a:lvl5pPr>
-            <a:lvl6pPr marL="2286000" indent="0">
-              <a:buNone/>
-              <a:defRPr sz="1600" b="1"/>
+            <a:lvl6pPr marL="2172157" indent="0">
+              <a:buNone/>
+              <a:defRPr sz="1520" b="1"/>
             </a:lvl6pPr>
-            <a:lvl7pPr marL="2743200" indent="0">
-              <a:buNone/>
-              <a:defRPr sz="1600" b="1"/>
+            <a:lvl7pPr marL="2606589" indent="0">
+              <a:buNone/>
+              <a:defRPr sz="1520" b="1"/>
             </a:lvl7pPr>
-            <a:lvl8pPr marL="3200400" indent="0">
-              <a:buNone/>
-              <a:defRPr sz="1600" b="1"/>
+            <a:lvl8pPr marL="3041020" indent="0">
+              <a:buNone/>
+              <a:defRPr sz="1520" b="1"/>
             </a:lvl8pPr>
-            <a:lvl9pPr marL="3657600" indent="0">
-              <a:buNone/>
-              <a:defRPr sz="1600" b="1"/>
+            <a:lvl9pPr marL="3475452" indent="0">
+              <a:buNone/>
+              <a:defRPr sz="1520" b="1"/>
             </a:lvl9pPr>
           </a:lstStyle>
           <a:p>
@@ -1607,13 +1425,7 @@
       </p:sp>
       <p:sp>
         <p:nvSpPr>
-          <p:cNvPr id="4" name="Content Placeholder 3">
-            <a:extLst>
-              <a:ext uri="{FF2B5EF4-FFF2-40B4-BE49-F238E27FC236}">
-                <a16:creationId xmlns:a16="http://schemas.microsoft.com/office/drawing/2014/main" id="{F9476946-D9BD-8EAD-7961-E9154CDEB936}"/>
-              </a:ext>
-            </a:extLst>
-          </p:cNvPr>
+          <p:cNvPr id="4" name="Content Placeholder 3"/>
           <p:cNvSpPr>
             <a:spLocks noGrp="1"/>
           </p:cNvSpPr>
@@ -1623,8 +1435,8 @@
         </p:nvSpPr>
         <p:spPr>
           <a:xfrm>
-            <a:off x="839788" y="2505075"/>
-            <a:ext cx="5157787" cy="3684588"/>
+            <a:off x="818247" y="2380401"/>
+            <a:ext cx="5025485" cy="3501212"/>
           </a:xfrm>
         </p:spPr>
         <p:txBody>
@@ -1664,19 +1476,13 @@
               <a:rPr lang="en-GB"/>
               <a:t>Fifth level</a:t>
             </a:r>
-            <a:endParaRPr lang="en-DE"/>
-          </a:p>
-        </p:txBody>
-      </p:sp>
-      <p:sp>
-        <p:nvSpPr>
-          <p:cNvPr id="5" name="Text Placeholder 4">
-            <a:extLst>
-              <a:ext uri="{FF2B5EF4-FFF2-40B4-BE49-F238E27FC236}">
-                <a16:creationId xmlns:a16="http://schemas.microsoft.com/office/drawing/2014/main" id="{3DA16E88-DD85-D479-CDC8-34D47552B3F0}"/>
-              </a:ext>
-            </a:extLst>
-          </p:cNvPr>
+            <a:endParaRPr lang="en-US" dirty="0"/>
+          </a:p>
+        </p:txBody>
+      </p:sp>
+      <p:sp>
+        <p:nvSpPr>
+          <p:cNvPr id="5" name="Text Placeholder 4"/>
           <p:cNvSpPr>
             <a:spLocks noGrp="1"/>
           </p:cNvSpPr>
@@ -1686,8 +1492,8 @@
         </p:nvSpPr>
         <p:spPr>
           <a:xfrm>
-            <a:off x="6172200" y="1681163"/>
-            <a:ext cx="5183188" cy="823912"/>
+            <a:off x="6013877" y="1597494"/>
+            <a:ext cx="5050234" cy="782907"/>
           </a:xfrm>
         </p:spPr>
         <p:txBody>
@@ -1695,39 +1501,39 @@
           <a:lstStyle>
             <a:lvl1pPr marL="0" indent="0">
               <a:buNone/>
-              <a:defRPr sz="2400" b="1"/>
+              <a:defRPr sz="2280" b="1"/>
             </a:lvl1pPr>
-            <a:lvl2pPr marL="457200" indent="0">
-              <a:buNone/>
-              <a:defRPr sz="2000" b="1"/>
+            <a:lvl2pPr marL="434431" indent="0">
+              <a:buNone/>
+              <a:defRPr sz="1900" b="1"/>
             </a:lvl2pPr>
-            <a:lvl3pPr marL="914400" indent="0">
-              <a:buNone/>
-              <a:defRPr sz="1800" b="1"/>
+            <a:lvl3pPr marL="868863" indent="0">
+              <a:buNone/>
+              <a:defRPr sz="1710" b="1"/>
             </a:lvl3pPr>
-            <a:lvl4pPr marL="1371600" indent="0">
-              <a:buNone/>
-              <a:defRPr sz="1600" b="1"/>
+            <a:lvl4pPr marL="1303294" indent="0">
+              <a:buNone/>
+              <a:defRPr sz="1520" b="1"/>
             </a:lvl4pPr>
-            <a:lvl5pPr marL="1828800" indent="0">
-              <a:buNone/>
-              <a:defRPr sz="1600" b="1"/>
+            <a:lvl5pPr marL="1737726" indent="0">
+              <a:buNone/>
+              <a:defRPr sz="1520" b="1"/>
             </a:lvl5pPr>
-            <a:lvl6pPr marL="2286000" indent="0">
-              <a:buNone/>
-              <a:defRPr sz="1600" b="1"/>
+            <a:lvl6pPr marL="2172157" indent="0">
+              <a:buNone/>
+              <a:defRPr sz="1520" b="1"/>
             </a:lvl6pPr>
-            <a:lvl7pPr marL="2743200" indent="0">
-              <a:buNone/>
-              <a:defRPr sz="1600" b="1"/>
+            <a:lvl7pPr marL="2606589" indent="0">
+              <a:buNone/>
+              <a:defRPr sz="1520" b="1"/>
             </a:lvl7pPr>
-            <a:lvl8pPr marL="3200400" indent="0">
-              <a:buNone/>
-              <a:defRPr sz="1600" b="1"/>
+            <a:lvl8pPr marL="3041020" indent="0">
+              <a:buNone/>
+              <a:defRPr sz="1520" b="1"/>
             </a:lvl8pPr>
-            <a:lvl9pPr marL="3657600" indent="0">
-              <a:buNone/>
-              <a:defRPr sz="1600" b="1"/>
+            <a:lvl9pPr marL="3475452" indent="0">
+              <a:buNone/>
+              <a:defRPr sz="1520" b="1"/>
             </a:lvl9pPr>
           </a:lstStyle>
           <a:p>
@@ -1741,13 +1547,7 @@
       </p:sp>
       <p:sp>
         <p:nvSpPr>
-          <p:cNvPr id="6" name="Content Placeholder 5">
-            <a:extLst>
-              <a:ext uri="{FF2B5EF4-FFF2-40B4-BE49-F238E27FC236}">
-                <a16:creationId xmlns:a16="http://schemas.microsoft.com/office/drawing/2014/main" id="{A09750E7-F5AA-A786-451F-AD8790BF92E9}"/>
-              </a:ext>
-            </a:extLst>
-          </p:cNvPr>
+          <p:cNvPr id="6" name="Content Placeholder 5"/>
           <p:cNvSpPr>
             <a:spLocks noGrp="1"/>
           </p:cNvSpPr>
@@ -1757,8 +1557,8 @@
         </p:nvSpPr>
         <p:spPr>
           <a:xfrm>
-            <a:off x="6172200" y="2505075"/>
-            <a:ext cx="5183188" cy="3684588"/>
+            <a:off x="6013877" y="2380401"/>
+            <a:ext cx="5050234" cy="3501212"/>
           </a:xfrm>
         </p:spPr>
         <p:txBody>
@@ -1798,19 +1598,13 @@
               <a:rPr lang="en-GB"/>
               <a:t>Fifth level</a:t>
             </a:r>
-            <a:endParaRPr lang="en-DE"/>
-          </a:p>
-        </p:txBody>
-      </p:sp>
-      <p:sp>
-        <p:nvSpPr>
-          <p:cNvPr id="7" name="Date Placeholder 6">
-            <a:extLst>
-              <a:ext uri="{FF2B5EF4-FFF2-40B4-BE49-F238E27FC236}">
-                <a16:creationId xmlns:a16="http://schemas.microsoft.com/office/drawing/2014/main" id="{76D06A4D-B278-9C06-B20F-EBF736021766}"/>
-              </a:ext>
-            </a:extLst>
-          </p:cNvPr>
+            <a:endParaRPr lang="en-US" dirty="0"/>
+          </a:p>
+        </p:txBody>
+      </p:sp>
+      <p:sp>
+        <p:nvSpPr>
+          <p:cNvPr id="7" name="Date Placeholder 6"/>
           <p:cNvSpPr>
             <a:spLocks noGrp="1"/>
           </p:cNvSpPr>
@@ -1823,9 +1617,9 @@
           <a:bodyPr/>
           <a:lstStyle/>
           <a:p>
-            <a:fld id="{4BA8C318-080F-194F-AFAE-76709D53A411}" type="datetimeFigureOut">
+            <a:fld id="{5D5EEEB1-9457-F541-8E93-E8346267924A}" type="datetimeFigureOut">
               <a:rPr lang="en-DE" smtClean="0"/>
-              <a:t>19.04.22</a:t>
+              <a:t>10.05.22</a:t>
             </a:fld>
             <a:endParaRPr lang="en-DE"/>
           </a:p>
@@ -1833,13 +1627,7 @@
       </p:sp>
       <p:sp>
         <p:nvSpPr>
-          <p:cNvPr id="8" name="Footer Placeholder 7">
-            <a:extLst>
-              <a:ext uri="{FF2B5EF4-FFF2-40B4-BE49-F238E27FC236}">
-                <a16:creationId xmlns:a16="http://schemas.microsoft.com/office/drawing/2014/main" id="{63945E50-B9ED-0249-5E19-31920356EAB2}"/>
-              </a:ext>
-            </a:extLst>
-          </p:cNvPr>
+          <p:cNvPr id="8" name="Footer Placeholder 7"/>
           <p:cNvSpPr>
             <a:spLocks noGrp="1"/>
           </p:cNvSpPr>
@@ -1858,13 +1646,7 @@
       </p:sp>
       <p:sp>
         <p:nvSpPr>
-          <p:cNvPr id="9" name="Slide Number Placeholder 8">
-            <a:extLst>
-              <a:ext uri="{FF2B5EF4-FFF2-40B4-BE49-F238E27FC236}">
-                <a16:creationId xmlns:a16="http://schemas.microsoft.com/office/drawing/2014/main" id="{BEF8C09A-9CED-A47C-8353-11EDDC2733B7}"/>
-              </a:ext>
-            </a:extLst>
-          </p:cNvPr>
+          <p:cNvPr id="9" name="Slide Number Placeholder 8"/>
           <p:cNvSpPr>
             <a:spLocks noGrp="1"/>
           </p:cNvSpPr>
@@ -1877,7 +1659,7 @@
           <a:bodyPr/>
           <a:lstStyle/>
           <a:p>
-            <a:fld id="{3E641AC2-74A6-0B45-AA7A-FDD9099B35B0}" type="slidenum">
+            <a:fld id="{AD889EE7-EA20-7649-8640-1575DCB12BE0}" type="slidenum">
               <a:rPr lang="en-DE" smtClean="0"/>
               <a:t>‹#›</a:t>
             </a:fld>
@@ -1888,7 +1670,7 @@
     </p:spTree>
     <p:extLst>
       <p:ext uri="{BB962C8B-B14F-4D97-AF65-F5344CB8AC3E}">
-        <p14:creationId xmlns:p14="http://schemas.microsoft.com/office/powerpoint/2010/main" val="975478024"/>
+        <p14:creationId xmlns:p14="http://schemas.microsoft.com/office/powerpoint/2010/main" val="982619558"/>
       </p:ext>
     </p:extLst>
   </p:cSld>
@@ -1917,13 +1699,7 @@
       </p:grpSpPr>
       <p:sp>
         <p:nvSpPr>
-          <p:cNvPr id="2" name="Title 1">
-            <a:extLst>
-              <a:ext uri="{FF2B5EF4-FFF2-40B4-BE49-F238E27FC236}">
-                <a16:creationId xmlns:a16="http://schemas.microsoft.com/office/drawing/2014/main" id="{0C0D4E16-FDA1-1844-DC70-AE1C24D8895F}"/>
-              </a:ext>
-            </a:extLst>
-          </p:cNvPr>
+          <p:cNvPr id="2" name="Title 1"/>
           <p:cNvSpPr>
             <a:spLocks noGrp="1"/>
           </p:cNvSpPr>
@@ -1940,19 +1716,13 @@
               <a:rPr lang="en-GB"/>
               <a:t>Click to edit Master title style</a:t>
             </a:r>
-            <a:endParaRPr lang="en-DE"/>
-          </a:p>
-        </p:txBody>
-      </p:sp>
-      <p:sp>
-        <p:nvSpPr>
-          <p:cNvPr id="3" name="Date Placeholder 2">
-            <a:extLst>
-              <a:ext uri="{FF2B5EF4-FFF2-40B4-BE49-F238E27FC236}">
-                <a16:creationId xmlns:a16="http://schemas.microsoft.com/office/drawing/2014/main" id="{8112440D-1C6E-DF7B-4CF0-75293EAA527C}"/>
-              </a:ext>
-            </a:extLst>
-          </p:cNvPr>
+            <a:endParaRPr lang="en-US" dirty="0"/>
+          </a:p>
+        </p:txBody>
+      </p:sp>
+      <p:sp>
+        <p:nvSpPr>
+          <p:cNvPr id="3" name="Date Placeholder 2"/>
           <p:cNvSpPr>
             <a:spLocks noGrp="1"/>
           </p:cNvSpPr>
@@ -1965,9 +1735,9 @@
           <a:bodyPr/>
           <a:lstStyle/>
           <a:p>
-            <a:fld id="{4BA8C318-080F-194F-AFAE-76709D53A411}" type="datetimeFigureOut">
+            <a:fld id="{5D5EEEB1-9457-F541-8E93-E8346267924A}" type="datetimeFigureOut">
               <a:rPr lang="en-DE" smtClean="0"/>
-              <a:t>19.04.22</a:t>
+              <a:t>10.05.22</a:t>
             </a:fld>
             <a:endParaRPr lang="en-DE"/>
           </a:p>
@@ -1975,13 +1745,7 @@
       </p:sp>
       <p:sp>
         <p:nvSpPr>
-          <p:cNvPr id="4" name="Footer Placeholder 3">
-            <a:extLst>
-              <a:ext uri="{FF2B5EF4-FFF2-40B4-BE49-F238E27FC236}">
-                <a16:creationId xmlns:a16="http://schemas.microsoft.com/office/drawing/2014/main" id="{B3574200-5579-A555-6B06-D6841FA1AADC}"/>
-              </a:ext>
-            </a:extLst>
-          </p:cNvPr>
+          <p:cNvPr id="4" name="Footer Placeholder 3"/>
           <p:cNvSpPr>
             <a:spLocks noGrp="1"/>
           </p:cNvSpPr>
@@ -2000,13 +1764,7 @@
       </p:sp>
       <p:sp>
         <p:nvSpPr>
-          <p:cNvPr id="5" name="Slide Number Placeholder 4">
-            <a:extLst>
-              <a:ext uri="{FF2B5EF4-FFF2-40B4-BE49-F238E27FC236}">
-                <a16:creationId xmlns:a16="http://schemas.microsoft.com/office/drawing/2014/main" id="{E78DCEB0-73F0-3150-BFE4-F6638B6FF8B8}"/>
-              </a:ext>
-            </a:extLst>
-          </p:cNvPr>
+          <p:cNvPr id="5" name="Slide Number Placeholder 4"/>
           <p:cNvSpPr>
             <a:spLocks noGrp="1"/>
           </p:cNvSpPr>
@@ -2019,7 +1777,7 @@
           <a:bodyPr/>
           <a:lstStyle/>
           <a:p>
-            <a:fld id="{3E641AC2-74A6-0B45-AA7A-FDD9099B35B0}" type="slidenum">
+            <a:fld id="{AD889EE7-EA20-7649-8640-1575DCB12BE0}" type="slidenum">
               <a:rPr lang="en-DE" smtClean="0"/>
               <a:t>‹#›</a:t>
             </a:fld>
@@ -2030,7 +1788,7 @@
     </p:spTree>
     <p:extLst>
       <p:ext uri="{BB962C8B-B14F-4D97-AF65-F5344CB8AC3E}">
-        <p14:creationId xmlns:p14="http://schemas.microsoft.com/office/powerpoint/2010/main" val="3169096787"/>
+        <p14:creationId xmlns:p14="http://schemas.microsoft.com/office/powerpoint/2010/main" val="499310288"/>
       </p:ext>
     </p:extLst>
   </p:cSld>
@@ -2059,13 +1817,7 @@
       </p:grpSpPr>
       <p:sp>
         <p:nvSpPr>
-          <p:cNvPr id="2" name="Date Placeholder 1">
-            <a:extLst>
-              <a:ext uri="{FF2B5EF4-FFF2-40B4-BE49-F238E27FC236}">
-                <a16:creationId xmlns:a16="http://schemas.microsoft.com/office/drawing/2014/main" id="{BC12232D-85E6-6B90-0528-DAAEA56ABD7A}"/>
-              </a:ext>
-            </a:extLst>
-          </p:cNvPr>
+          <p:cNvPr id="2" name="Date Placeholder 1"/>
           <p:cNvSpPr>
             <a:spLocks noGrp="1"/>
           </p:cNvSpPr>
@@ -2078,9 +1830,9 @@
           <a:bodyPr/>
           <a:lstStyle/>
           <a:p>
-            <a:fld id="{4BA8C318-080F-194F-AFAE-76709D53A411}" type="datetimeFigureOut">
+            <a:fld id="{5D5EEEB1-9457-F541-8E93-E8346267924A}" type="datetimeFigureOut">
               <a:rPr lang="en-DE" smtClean="0"/>
-              <a:t>19.04.22</a:t>
+              <a:t>10.05.22</a:t>
             </a:fld>
             <a:endParaRPr lang="en-DE"/>
           </a:p>
@@ -2088,13 +1840,7 @@
       </p:sp>
       <p:sp>
         <p:nvSpPr>
-          <p:cNvPr id="3" name="Footer Placeholder 2">
-            <a:extLst>
-              <a:ext uri="{FF2B5EF4-FFF2-40B4-BE49-F238E27FC236}">
-                <a16:creationId xmlns:a16="http://schemas.microsoft.com/office/drawing/2014/main" id="{D39A6B6B-4786-4797-9C6C-19BA5AACFDE7}"/>
-              </a:ext>
-            </a:extLst>
-          </p:cNvPr>
+          <p:cNvPr id="3" name="Footer Placeholder 2"/>
           <p:cNvSpPr>
             <a:spLocks noGrp="1"/>
           </p:cNvSpPr>
@@ -2113,13 +1859,7 @@
       </p:sp>
       <p:sp>
         <p:nvSpPr>
-          <p:cNvPr id="4" name="Slide Number Placeholder 3">
-            <a:extLst>
-              <a:ext uri="{FF2B5EF4-FFF2-40B4-BE49-F238E27FC236}">
-                <a16:creationId xmlns:a16="http://schemas.microsoft.com/office/drawing/2014/main" id="{F1BC4898-B207-6FAC-E7C5-13E8E3AF3A8B}"/>
-              </a:ext>
-            </a:extLst>
-          </p:cNvPr>
+          <p:cNvPr id="4" name="Slide Number Placeholder 3"/>
           <p:cNvSpPr>
             <a:spLocks noGrp="1"/>
           </p:cNvSpPr>
@@ -2132,7 +1872,7 @@
           <a:bodyPr/>
           <a:lstStyle/>
           <a:p>
-            <a:fld id="{3E641AC2-74A6-0B45-AA7A-FDD9099B35B0}" type="slidenum">
+            <a:fld id="{AD889EE7-EA20-7649-8640-1575DCB12BE0}" type="slidenum">
               <a:rPr lang="en-DE" smtClean="0"/>
               <a:t>‹#›</a:t>
             </a:fld>
@@ -2143,7 +1883,7 @@
     </p:spTree>
     <p:extLst>
       <p:ext uri="{BB962C8B-B14F-4D97-AF65-F5344CB8AC3E}">
-        <p14:creationId xmlns:p14="http://schemas.microsoft.com/office/powerpoint/2010/main" val="2372494428"/>
+        <p14:creationId xmlns:p14="http://schemas.microsoft.com/office/powerpoint/2010/main" val="3934679728"/>
       </p:ext>
     </p:extLst>
   </p:cSld>
@@ -2172,13 +1912,7 @@
       </p:grpSpPr>
       <p:sp>
         <p:nvSpPr>
-          <p:cNvPr id="2" name="Title 1">
-            <a:extLst>
-              <a:ext uri="{FF2B5EF4-FFF2-40B4-BE49-F238E27FC236}">
-                <a16:creationId xmlns:a16="http://schemas.microsoft.com/office/drawing/2014/main" id="{6A26F7FF-55CE-B119-C2E4-C12DDC0D84BB}"/>
-              </a:ext>
-            </a:extLst>
-          </p:cNvPr>
+          <p:cNvPr id="2" name="Title 1"/>
           <p:cNvSpPr>
             <a:spLocks noGrp="1"/>
           </p:cNvSpPr>
@@ -2188,15 +1922,15 @@
         </p:nvSpPr>
         <p:spPr>
           <a:xfrm>
-            <a:off x="839788" y="457200"/>
-            <a:ext cx="3932237" cy="1600200"/>
+            <a:off x="818247" y="434446"/>
+            <a:ext cx="3831371" cy="1520561"/>
           </a:xfrm>
         </p:spPr>
         <p:txBody>
           <a:bodyPr anchor="b"/>
           <a:lstStyle>
             <a:lvl1pPr>
-              <a:defRPr sz="3200"/>
+              <a:defRPr sz="3041"/>
             </a:lvl1pPr>
           </a:lstStyle>
           <a:p>
@@ -2204,19 +1938,13 @@
               <a:rPr lang="en-GB"/>
               <a:t>Click to edit Master title style</a:t>
             </a:r>
-            <a:endParaRPr lang="en-DE"/>
-          </a:p>
-        </p:txBody>
-      </p:sp>
-      <p:sp>
-        <p:nvSpPr>
-          <p:cNvPr id="3" name="Content Placeholder 2">
-            <a:extLst>
-              <a:ext uri="{FF2B5EF4-FFF2-40B4-BE49-F238E27FC236}">
-                <a16:creationId xmlns:a16="http://schemas.microsoft.com/office/drawing/2014/main" id="{E68CA9E7-C158-216C-1FD7-5766D366C1F2}"/>
-              </a:ext>
-            </a:extLst>
-          </p:cNvPr>
+            <a:endParaRPr lang="en-US" dirty="0"/>
+          </a:p>
+        </p:txBody>
+      </p:sp>
+      <p:sp>
+        <p:nvSpPr>
+          <p:cNvPr id="3" name="Content Placeholder 2"/>
           <p:cNvSpPr>
             <a:spLocks noGrp="1"/>
           </p:cNvSpPr>
@@ -2226,39 +1954,39 @@
         </p:nvSpPr>
         <p:spPr>
           <a:xfrm>
-            <a:off x="5183188" y="987425"/>
-            <a:ext cx="6172200" cy="4873625"/>
+            <a:off x="5050234" y="938283"/>
+            <a:ext cx="6013877" cy="4631072"/>
           </a:xfrm>
         </p:spPr>
         <p:txBody>
           <a:bodyPr/>
           <a:lstStyle>
             <a:lvl1pPr>
-              <a:defRPr sz="3200"/>
+              <a:defRPr sz="3041"/>
             </a:lvl1pPr>
             <a:lvl2pPr>
-              <a:defRPr sz="2800"/>
+              <a:defRPr sz="2661"/>
             </a:lvl2pPr>
             <a:lvl3pPr>
-              <a:defRPr sz="2400"/>
+              <a:defRPr sz="2280"/>
             </a:lvl3pPr>
             <a:lvl4pPr>
-              <a:defRPr sz="2000"/>
+              <a:defRPr sz="1900"/>
             </a:lvl4pPr>
             <a:lvl5pPr>
-              <a:defRPr sz="2000"/>
+              <a:defRPr sz="1900"/>
             </a:lvl5pPr>
             <a:lvl6pPr>
-              <a:defRPr sz="2000"/>
+              <a:defRPr sz="1900"/>
             </a:lvl6pPr>
             <a:lvl7pPr>
-              <a:defRPr sz="2000"/>
+              <a:defRPr sz="1900"/>
             </a:lvl7pPr>
             <a:lvl8pPr>
-              <a:defRPr sz="2000"/>
+              <a:defRPr sz="1900"/>
             </a:lvl8pPr>
             <a:lvl9pPr>
-              <a:defRPr sz="2000"/>
+              <a:defRPr sz="1900"/>
             </a:lvl9pPr>
           </a:lstStyle>
           <a:p>
@@ -2295,19 +2023,13 @@
               <a:rPr lang="en-GB"/>
               <a:t>Fifth level</a:t>
             </a:r>
-            <a:endParaRPr lang="en-DE"/>
-          </a:p>
-        </p:txBody>
-      </p:sp>
-      <p:sp>
-        <p:nvSpPr>
-          <p:cNvPr id="4" name="Text Placeholder 3">
-            <a:extLst>
-              <a:ext uri="{FF2B5EF4-FFF2-40B4-BE49-F238E27FC236}">
-                <a16:creationId xmlns:a16="http://schemas.microsoft.com/office/drawing/2014/main" id="{788C445E-EC62-F04B-EC53-64179406D5E1}"/>
-              </a:ext>
-            </a:extLst>
-          </p:cNvPr>
+            <a:endParaRPr lang="en-US" dirty="0"/>
+          </a:p>
+        </p:txBody>
+      </p:sp>
+      <p:sp>
+        <p:nvSpPr>
+          <p:cNvPr id="4" name="Text Placeholder 3"/>
           <p:cNvSpPr>
             <a:spLocks noGrp="1"/>
           </p:cNvSpPr>
@@ -2317,8 +2039,8 @@
         </p:nvSpPr>
         <p:spPr>
           <a:xfrm>
-            <a:off x="839788" y="2057400"/>
-            <a:ext cx="3932237" cy="3811588"/>
+            <a:off x="818247" y="1955006"/>
+            <a:ext cx="3831371" cy="3621891"/>
           </a:xfrm>
         </p:spPr>
         <p:txBody>
@@ -2326,39 +2048,39 @@
           <a:lstStyle>
             <a:lvl1pPr marL="0" indent="0">
               <a:buNone/>
-              <a:defRPr sz="1600"/>
+              <a:defRPr sz="1520"/>
             </a:lvl1pPr>
-            <a:lvl2pPr marL="457200" indent="0">
-              <a:buNone/>
-              <a:defRPr sz="1400"/>
+            <a:lvl2pPr marL="434431" indent="0">
+              <a:buNone/>
+              <a:defRPr sz="1330"/>
             </a:lvl2pPr>
-            <a:lvl3pPr marL="914400" indent="0">
-              <a:buNone/>
-              <a:defRPr sz="1200"/>
+            <a:lvl3pPr marL="868863" indent="0">
+              <a:buNone/>
+              <a:defRPr sz="1140"/>
             </a:lvl3pPr>
-            <a:lvl4pPr marL="1371600" indent="0">
-              <a:buNone/>
-              <a:defRPr sz="1000"/>
+            <a:lvl4pPr marL="1303294" indent="0">
+              <a:buNone/>
+              <a:defRPr sz="950"/>
             </a:lvl4pPr>
-            <a:lvl5pPr marL="1828800" indent="0">
-              <a:buNone/>
-              <a:defRPr sz="1000"/>
+            <a:lvl5pPr marL="1737726" indent="0">
+              <a:buNone/>
+              <a:defRPr sz="950"/>
             </a:lvl5pPr>
-            <a:lvl6pPr marL="2286000" indent="0">
-              <a:buNone/>
-              <a:defRPr sz="1000"/>
+            <a:lvl6pPr marL="2172157" indent="0">
+              <a:buNone/>
+              <a:defRPr sz="950"/>
             </a:lvl6pPr>
-            <a:lvl7pPr marL="2743200" indent="0">
-              <a:buNone/>
-              <a:defRPr sz="1000"/>
+            <a:lvl7pPr marL="2606589" indent="0">
+              <a:buNone/>
+              <a:defRPr sz="950"/>
             </a:lvl7pPr>
-            <a:lvl8pPr marL="3200400" indent="0">
-              <a:buNone/>
-              <a:defRPr sz="1000"/>
+            <a:lvl8pPr marL="3041020" indent="0">
+              <a:buNone/>
+              <a:defRPr sz="950"/>
             </a:lvl8pPr>
-            <a:lvl9pPr marL="3657600" indent="0">
-              <a:buNone/>
-              <a:defRPr sz="1000"/>
+            <a:lvl9pPr marL="3475452" indent="0">
+              <a:buNone/>
+              <a:defRPr sz="950"/>
             </a:lvl9pPr>
           </a:lstStyle>
           <a:p>
@@ -2372,13 +2094,7 @@
       </p:sp>
       <p:sp>
         <p:nvSpPr>
-          <p:cNvPr id="5" name="Date Placeholder 4">
-            <a:extLst>
-              <a:ext uri="{FF2B5EF4-FFF2-40B4-BE49-F238E27FC236}">
-                <a16:creationId xmlns:a16="http://schemas.microsoft.com/office/drawing/2014/main" id="{E08C440B-8C3F-4386-D065-003248CC9EBF}"/>
-              </a:ext>
-            </a:extLst>
-          </p:cNvPr>
+          <p:cNvPr id="5" name="Date Placeholder 4"/>
           <p:cNvSpPr>
             <a:spLocks noGrp="1"/>
           </p:cNvSpPr>
@@ -2391,9 +2107,9 @@
           <a:bodyPr/>
           <a:lstStyle/>
           <a:p>
-            <a:fld id="{4BA8C318-080F-194F-AFAE-76709D53A411}" type="datetimeFigureOut">
+            <a:fld id="{5D5EEEB1-9457-F541-8E93-E8346267924A}" type="datetimeFigureOut">
               <a:rPr lang="en-DE" smtClean="0"/>
-              <a:t>19.04.22</a:t>
+              <a:t>10.05.22</a:t>
             </a:fld>
             <a:endParaRPr lang="en-DE"/>
           </a:p>
@@ -2401,13 +2117,7 @@
       </p:sp>
       <p:sp>
         <p:nvSpPr>
-          <p:cNvPr id="6" name="Footer Placeholder 5">
-            <a:extLst>
-              <a:ext uri="{FF2B5EF4-FFF2-40B4-BE49-F238E27FC236}">
-                <a16:creationId xmlns:a16="http://schemas.microsoft.com/office/drawing/2014/main" id="{182B56E2-5281-0541-4980-626F80511090}"/>
-              </a:ext>
-            </a:extLst>
-          </p:cNvPr>
+          <p:cNvPr id="6" name="Footer Placeholder 5"/>
           <p:cNvSpPr>
             <a:spLocks noGrp="1"/>
           </p:cNvSpPr>
@@ -2426,13 +2136,7 @@
       </p:sp>
       <p:sp>
         <p:nvSpPr>
-          <p:cNvPr id="7" name="Slide Number Placeholder 6">
-            <a:extLst>
-              <a:ext uri="{FF2B5EF4-FFF2-40B4-BE49-F238E27FC236}">
-                <a16:creationId xmlns:a16="http://schemas.microsoft.com/office/drawing/2014/main" id="{0E35677A-44F4-8A05-66FF-2ABAD999D1B5}"/>
-              </a:ext>
-            </a:extLst>
-          </p:cNvPr>
+          <p:cNvPr id="7" name="Slide Number Placeholder 6"/>
           <p:cNvSpPr>
             <a:spLocks noGrp="1"/>
           </p:cNvSpPr>
@@ -2445,7 +2149,7 @@
           <a:bodyPr/>
           <a:lstStyle/>
           <a:p>
-            <a:fld id="{3E641AC2-74A6-0B45-AA7A-FDD9099B35B0}" type="slidenum">
+            <a:fld id="{AD889EE7-EA20-7649-8640-1575DCB12BE0}" type="slidenum">
               <a:rPr lang="en-DE" smtClean="0"/>
               <a:t>‹#›</a:t>
             </a:fld>
@@ -2456,7 +2160,7 @@
     </p:spTree>
     <p:extLst>
       <p:ext uri="{BB962C8B-B14F-4D97-AF65-F5344CB8AC3E}">
-        <p14:creationId xmlns:p14="http://schemas.microsoft.com/office/powerpoint/2010/main" val="2779238526"/>
+        <p14:creationId xmlns:p14="http://schemas.microsoft.com/office/powerpoint/2010/main" val="424893603"/>
       </p:ext>
     </p:extLst>
   </p:cSld>
@@ -2485,13 +2189,7 @@
       </p:grpSpPr>
       <p:sp>
         <p:nvSpPr>
-          <p:cNvPr id="2" name="Title 1">
-            <a:extLst>
-              <a:ext uri="{FF2B5EF4-FFF2-40B4-BE49-F238E27FC236}">
-                <a16:creationId xmlns:a16="http://schemas.microsoft.com/office/drawing/2014/main" id="{48781BB2-1E45-8140-78F5-E0407BF83103}"/>
-              </a:ext>
-            </a:extLst>
-          </p:cNvPr>
+          <p:cNvPr id="2" name="Title 1"/>
           <p:cNvSpPr>
             <a:spLocks noGrp="1"/>
           </p:cNvSpPr>
@@ -2501,15 +2199,15 @@
         </p:nvSpPr>
         <p:spPr>
           <a:xfrm>
-            <a:off x="839788" y="457200"/>
-            <a:ext cx="3932237" cy="1600200"/>
+            <a:off x="818247" y="434446"/>
+            <a:ext cx="3831371" cy="1520561"/>
           </a:xfrm>
         </p:spPr>
         <p:txBody>
           <a:bodyPr anchor="b"/>
           <a:lstStyle>
             <a:lvl1pPr>
-              <a:defRPr sz="3200"/>
+              <a:defRPr sz="3041"/>
             </a:lvl1pPr>
           </a:lstStyle>
           <a:p>
@@ -2517,21 +2215,15 @@
               <a:rPr lang="en-GB"/>
               <a:t>Click to edit Master title style</a:t>
             </a:r>
-            <a:endParaRPr lang="en-DE"/>
-          </a:p>
-        </p:txBody>
-      </p:sp>
-      <p:sp>
-        <p:nvSpPr>
-          <p:cNvPr id="3" name="Picture Placeholder 2">
-            <a:extLst>
-              <a:ext uri="{FF2B5EF4-FFF2-40B4-BE49-F238E27FC236}">
-                <a16:creationId xmlns:a16="http://schemas.microsoft.com/office/drawing/2014/main" id="{98FE3D54-BA70-DE45-1B86-5E3889E2427E}"/>
-              </a:ext>
-            </a:extLst>
-          </p:cNvPr>
-          <p:cNvSpPr>
-            <a:spLocks noGrp="1"/>
+            <a:endParaRPr lang="en-US" dirty="0"/>
+          </a:p>
+        </p:txBody>
+      </p:sp>
+      <p:sp>
+        <p:nvSpPr>
+          <p:cNvPr id="3" name="Picture Placeholder 2"/>
+          <p:cNvSpPr>
+            <a:spLocks noGrp="1" noChangeAspect="1"/>
           </p:cNvSpPr>
           <p:nvPr>
             <p:ph type="pic" idx="1"/>
@@ -2539,64 +2231,62 @@
         </p:nvSpPr>
         <p:spPr>
           <a:xfrm>
-            <a:off x="5183188" y="987425"/>
-            <a:ext cx="6172200" cy="4873625"/>
+            <a:off x="5050234" y="938283"/>
+            <a:ext cx="6013877" cy="4631072"/>
           </a:xfrm>
         </p:spPr>
         <p:txBody>
-          <a:bodyPr/>
+          <a:bodyPr anchor="t"/>
           <a:lstStyle>
             <a:lvl1pPr marL="0" indent="0">
               <a:buNone/>
-              <a:defRPr sz="3200"/>
+              <a:defRPr sz="3041"/>
             </a:lvl1pPr>
-            <a:lvl2pPr marL="457200" indent="0">
-              <a:buNone/>
-              <a:defRPr sz="2800"/>
+            <a:lvl2pPr marL="434431" indent="0">
+              <a:buNone/>
+              <a:defRPr sz="2661"/>
             </a:lvl2pPr>
-            <a:lvl3pPr marL="914400" indent="0">
-              <a:buNone/>
-              <a:defRPr sz="2400"/>
+            <a:lvl3pPr marL="868863" indent="0">
+              <a:buNone/>
+              <a:defRPr sz="2280"/>
             </a:lvl3pPr>
-            <a:lvl4pPr marL="1371600" indent="0">
-              <a:buNone/>
-              <a:defRPr sz="2000"/>
+            <a:lvl4pPr marL="1303294" indent="0">
+              <a:buNone/>
+              <a:defRPr sz="1900"/>
             </a:lvl4pPr>
-            <a:lvl5pPr marL="1828800" indent="0">
-              <a:buNone/>
-              <a:defRPr sz="2000"/>
+            <a:lvl5pPr marL="1737726" indent="0">
+              <a:buNone/>
+              <a:defRPr sz="1900"/>
             </a:lvl5pPr>
-            <a:lvl6pPr marL="2286000" indent="0">
-              <a:buNone/>
-              <a:defRPr sz="2000"/>
+            <a:lvl6pPr marL="2172157" indent="0">
+              <a:buNone/>
+              <a:defRPr sz="1900"/>
             </a:lvl6pPr>
-            <a:lvl7pPr marL="2743200" indent="0">
-              <a:buNone/>
-              <a:defRPr sz="2000"/>
+            <a:lvl7pPr marL="2606589" indent="0">
+              <a:buNone/>
+              <a:defRPr sz="1900"/>
             </a:lvl7pPr>
-            <a:lvl8pPr marL="3200400" indent="0">
-              <a:buNone/>
-              <a:defRPr sz="2000"/>
+            <a:lvl8pPr marL="3041020" indent="0">
+              <a:buNone/>
+              <a:defRPr sz="1900"/>
             </a:lvl8pPr>
-            <a:lvl9pPr marL="3657600" indent="0">
-              <a:buNone/>
-              <a:defRPr sz="2000"/>
+            <a:lvl9pPr marL="3475452" indent="0">
+              <a:buNone/>
+              <a:defRPr sz="1900"/>
             </a:lvl9pPr>
           </a:lstStyle>
           <a:p>
-            <a:endParaRPr lang="en-DE"/>
-          </a:p>
-        </p:txBody>
-      </p:sp>
-      <p:sp>
-        <p:nvSpPr>
-          <p:cNvPr id="4" name="Text Placeholder 3">
-            <a:extLst>
-              <a:ext uri="{FF2B5EF4-FFF2-40B4-BE49-F238E27FC236}">
-                <a16:creationId xmlns:a16="http://schemas.microsoft.com/office/drawing/2014/main" id="{C9A3711E-85FC-3E53-FD88-8D45335A6264}"/>
-              </a:ext>
-            </a:extLst>
-          </p:cNvPr>
+            <a:r>
+              <a:rPr lang="en-GB"/>
+              <a:t>Click icon to add picture</a:t>
+            </a:r>
+            <a:endParaRPr lang="en-US" dirty="0"/>
+          </a:p>
+        </p:txBody>
+      </p:sp>
+      <p:sp>
+        <p:nvSpPr>
+          <p:cNvPr id="4" name="Text Placeholder 3"/>
           <p:cNvSpPr>
             <a:spLocks noGrp="1"/>
           </p:cNvSpPr>
@@ -2606,8 +2296,8 @@
         </p:nvSpPr>
         <p:spPr>
           <a:xfrm>
-            <a:off x="839788" y="2057400"/>
-            <a:ext cx="3932237" cy="3811588"/>
+            <a:off x="818247" y="1955006"/>
+            <a:ext cx="3831371" cy="3621891"/>
           </a:xfrm>
         </p:spPr>
         <p:txBody>
@@ -2615,39 +2305,39 @@
           <a:lstStyle>
             <a:lvl1pPr marL="0" indent="0">
               <a:buNone/>
-              <a:defRPr sz="1600"/>
+              <a:defRPr sz="1520"/>
             </a:lvl1pPr>
-            <a:lvl2pPr marL="457200" indent="0">
-              <a:buNone/>
-              <a:defRPr sz="1400"/>
+            <a:lvl2pPr marL="434431" indent="0">
+              <a:buNone/>
+              <a:defRPr sz="1330"/>
             </a:lvl2pPr>
-            <a:lvl3pPr marL="914400" indent="0">
-              <a:buNone/>
-              <a:defRPr sz="1200"/>
+            <a:lvl3pPr marL="868863" indent="0">
+              <a:buNone/>
+              <a:defRPr sz="1140"/>
             </a:lvl3pPr>
-            <a:lvl4pPr marL="1371600" indent="0">
-              <a:buNone/>
-              <a:defRPr sz="1000"/>
+            <a:lvl4pPr marL="1303294" indent="0">
+              <a:buNone/>
+              <a:defRPr sz="950"/>
             </a:lvl4pPr>
-            <a:lvl5pPr marL="1828800" indent="0">
-              <a:buNone/>
-              <a:defRPr sz="1000"/>
+            <a:lvl5pPr marL="1737726" indent="0">
+              <a:buNone/>
+              <a:defRPr sz="950"/>
             </a:lvl5pPr>
-            <a:lvl6pPr marL="2286000" indent="0">
-              <a:buNone/>
-              <a:defRPr sz="1000"/>
+            <a:lvl6pPr marL="2172157" indent="0">
+              <a:buNone/>
+              <a:defRPr sz="950"/>
             </a:lvl6pPr>
-            <a:lvl7pPr marL="2743200" indent="0">
-              <a:buNone/>
-              <a:defRPr sz="1000"/>
+            <a:lvl7pPr marL="2606589" indent="0">
+              <a:buNone/>
+              <a:defRPr sz="950"/>
             </a:lvl7pPr>
-            <a:lvl8pPr marL="3200400" indent="0">
-              <a:buNone/>
-              <a:defRPr sz="1000"/>
+            <a:lvl8pPr marL="3041020" indent="0">
+              <a:buNone/>
+              <a:defRPr sz="950"/>
             </a:lvl8pPr>
-            <a:lvl9pPr marL="3657600" indent="0">
-              <a:buNone/>
-              <a:defRPr sz="1000"/>
+            <a:lvl9pPr marL="3475452" indent="0">
+              <a:buNone/>
+              <a:defRPr sz="950"/>
             </a:lvl9pPr>
           </a:lstStyle>
           <a:p>
@@ -2661,13 +2351,7 @@
       </p:sp>
       <p:sp>
         <p:nvSpPr>
-          <p:cNvPr id="5" name="Date Placeholder 4">
-            <a:extLst>
-              <a:ext uri="{FF2B5EF4-FFF2-40B4-BE49-F238E27FC236}">
-                <a16:creationId xmlns:a16="http://schemas.microsoft.com/office/drawing/2014/main" id="{5A56BBE3-093C-23FC-74EA-BAAC3C37A652}"/>
-              </a:ext>
-            </a:extLst>
-          </p:cNvPr>
+          <p:cNvPr id="5" name="Date Placeholder 4"/>
           <p:cNvSpPr>
             <a:spLocks noGrp="1"/>
           </p:cNvSpPr>
@@ -2680,9 +2364,9 @@
           <a:bodyPr/>
           <a:lstStyle/>
           <a:p>
-            <a:fld id="{4BA8C318-080F-194F-AFAE-76709D53A411}" type="datetimeFigureOut">
+            <a:fld id="{5D5EEEB1-9457-F541-8E93-E8346267924A}" type="datetimeFigureOut">
               <a:rPr lang="en-DE" smtClean="0"/>
-              <a:t>19.04.22</a:t>
+              <a:t>10.05.22</a:t>
             </a:fld>
             <a:endParaRPr lang="en-DE"/>
           </a:p>
@@ -2690,13 +2374,7 @@
       </p:sp>
       <p:sp>
         <p:nvSpPr>
-          <p:cNvPr id="6" name="Footer Placeholder 5">
-            <a:extLst>
-              <a:ext uri="{FF2B5EF4-FFF2-40B4-BE49-F238E27FC236}">
-                <a16:creationId xmlns:a16="http://schemas.microsoft.com/office/drawing/2014/main" id="{23BA51A3-3CC6-E3C4-DDB6-86915583F606}"/>
-              </a:ext>
-            </a:extLst>
-          </p:cNvPr>
+          <p:cNvPr id="6" name="Footer Placeholder 5"/>
           <p:cNvSpPr>
             <a:spLocks noGrp="1"/>
           </p:cNvSpPr>
@@ -2715,13 +2393,7 @@
       </p:sp>
       <p:sp>
         <p:nvSpPr>
-          <p:cNvPr id="7" name="Slide Number Placeholder 6">
-            <a:extLst>
-              <a:ext uri="{FF2B5EF4-FFF2-40B4-BE49-F238E27FC236}">
-                <a16:creationId xmlns:a16="http://schemas.microsoft.com/office/drawing/2014/main" id="{A7495D8C-ED16-4239-B0BF-5DF7A308B38E}"/>
-              </a:ext>
-            </a:extLst>
-          </p:cNvPr>
+          <p:cNvPr id="7" name="Slide Number Placeholder 6"/>
           <p:cNvSpPr>
             <a:spLocks noGrp="1"/>
           </p:cNvSpPr>
@@ -2734,7 +2406,7 @@
           <a:bodyPr/>
           <a:lstStyle/>
           <a:p>
-            <a:fld id="{3E641AC2-74A6-0B45-AA7A-FDD9099B35B0}" type="slidenum">
+            <a:fld id="{AD889EE7-EA20-7649-8640-1575DCB12BE0}" type="slidenum">
               <a:rPr lang="en-DE" smtClean="0"/>
               <a:t>‹#›</a:t>
             </a:fld>
@@ -2745,7 +2417,7 @@
     </p:spTree>
     <p:extLst>
       <p:ext uri="{BB962C8B-B14F-4D97-AF65-F5344CB8AC3E}">
-        <p14:creationId xmlns:p14="http://schemas.microsoft.com/office/powerpoint/2010/main" val="1387217963"/>
+        <p14:creationId xmlns:p14="http://schemas.microsoft.com/office/powerpoint/2010/main" val="797296489"/>
       </p:ext>
     </p:extLst>
   </p:cSld>
@@ -2779,13 +2451,7 @@
       </p:grpSpPr>
       <p:sp>
         <p:nvSpPr>
-          <p:cNvPr id="2" name="Title Placeholder 1">
-            <a:extLst>
-              <a:ext uri="{FF2B5EF4-FFF2-40B4-BE49-F238E27FC236}">
-                <a16:creationId xmlns:a16="http://schemas.microsoft.com/office/drawing/2014/main" id="{806D4C72-71D0-D68A-A7AD-C5AE90585661}"/>
-              </a:ext>
-            </a:extLst>
-          </p:cNvPr>
+          <p:cNvPr id="2" name="Title Placeholder 1"/>
           <p:cNvSpPr>
             <a:spLocks noGrp="1"/>
           </p:cNvSpPr>
@@ -2795,8 +2461,8 @@
         </p:nvSpPr>
         <p:spPr>
           <a:xfrm>
-            <a:off x="838200" y="365125"/>
-            <a:ext cx="10515600" cy="1325563"/>
+            <a:off x="816700" y="346954"/>
+            <a:ext cx="10245864" cy="1259592"/>
           </a:xfrm>
           <a:prstGeom prst="rect">
             <a:avLst/>
@@ -2812,19 +2478,13 @@
               <a:rPr lang="en-GB"/>
               <a:t>Click to edit Master title style</a:t>
             </a:r>
-            <a:endParaRPr lang="en-DE"/>
-          </a:p>
-        </p:txBody>
-      </p:sp>
-      <p:sp>
-        <p:nvSpPr>
-          <p:cNvPr id="3" name="Text Placeholder 2">
-            <a:extLst>
-              <a:ext uri="{FF2B5EF4-FFF2-40B4-BE49-F238E27FC236}">
-                <a16:creationId xmlns:a16="http://schemas.microsoft.com/office/drawing/2014/main" id="{33719D9F-547F-0729-ED52-37AC22058905}"/>
-              </a:ext>
-            </a:extLst>
-          </p:cNvPr>
+            <a:endParaRPr lang="en-US" dirty="0"/>
+          </a:p>
+        </p:txBody>
+      </p:sp>
+      <p:sp>
+        <p:nvSpPr>
+          <p:cNvPr id="3" name="Text Placeholder 2"/>
           <p:cNvSpPr>
             <a:spLocks noGrp="1"/>
           </p:cNvSpPr>
@@ -2834,8 +2494,8 @@
         </p:nvSpPr>
         <p:spPr>
           <a:xfrm>
-            <a:off x="838200" y="1825625"/>
-            <a:ext cx="10515600" cy="4351338"/>
+            <a:off x="816700" y="1734766"/>
+            <a:ext cx="10245864" cy="4134779"/>
           </a:xfrm>
           <a:prstGeom prst="rect">
             <a:avLst/>
@@ -2880,19 +2540,13 @@
               <a:rPr lang="en-GB"/>
               <a:t>Fifth level</a:t>
             </a:r>
-            <a:endParaRPr lang="en-DE"/>
-          </a:p>
-        </p:txBody>
-      </p:sp>
-      <p:sp>
-        <p:nvSpPr>
-          <p:cNvPr id="4" name="Date Placeholder 3">
-            <a:extLst>
-              <a:ext uri="{FF2B5EF4-FFF2-40B4-BE49-F238E27FC236}">
-                <a16:creationId xmlns:a16="http://schemas.microsoft.com/office/drawing/2014/main" id="{B2E1F9C8-525D-6833-D8AD-3A1CE48C9242}"/>
-              </a:ext>
-            </a:extLst>
-          </p:cNvPr>
+            <a:endParaRPr lang="en-US" dirty="0"/>
+          </a:p>
+        </p:txBody>
+      </p:sp>
+      <p:sp>
+        <p:nvSpPr>
+          <p:cNvPr id="4" name="Date Placeholder 3"/>
           <p:cNvSpPr>
             <a:spLocks noGrp="1"/>
           </p:cNvSpPr>
@@ -2902,8 +2556,8 @@
         </p:nvSpPr>
         <p:spPr>
           <a:xfrm>
-            <a:off x="838200" y="6356350"/>
-            <a:ext cx="2743200" cy="365125"/>
+            <a:off x="816699" y="6040005"/>
+            <a:ext cx="2672834" cy="346953"/>
           </a:xfrm>
           <a:prstGeom prst="rect">
             <a:avLst/>
@@ -2913,7 +2567,7 @@
           <a:bodyPr vert="horz" lIns="91440" tIns="45720" rIns="91440" bIns="45720" rtlCol="0" anchor="ctr"/>
           <a:lstStyle>
             <a:lvl1pPr algn="l">
-              <a:defRPr sz="1200">
+              <a:defRPr sz="1140">
                 <a:solidFill>
                   <a:schemeClr val="tx1">
                     <a:tint val="75000"/>
@@ -2923,9 +2577,9 @@
             </a:lvl1pPr>
           </a:lstStyle>
           <a:p>
-            <a:fld id="{4BA8C318-080F-194F-AFAE-76709D53A411}" type="datetimeFigureOut">
+            <a:fld id="{5D5EEEB1-9457-F541-8E93-E8346267924A}" type="datetimeFigureOut">
               <a:rPr lang="en-DE" smtClean="0"/>
-              <a:t>19.04.22</a:t>
+              <a:t>10.05.22</a:t>
             </a:fld>
             <a:endParaRPr lang="en-DE"/>
           </a:p>
@@ -2933,13 +2587,7 @@
       </p:sp>
       <p:sp>
         <p:nvSpPr>
-          <p:cNvPr id="5" name="Footer Placeholder 4">
-            <a:extLst>
-              <a:ext uri="{FF2B5EF4-FFF2-40B4-BE49-F238E27FC236}">
-                <a16:creationId xmlns:a16="http://schemas.microsoft.com/office/drawing/2014/main" id="{708FB426-FA97-84F9-F2C1-2F4110C01CDF}"/>
-              </a:ext>
-            </a:extLst>
-          </p:cNvPr>
+          <p:cNvPr id="5" name="Footer Placeholder 4"/>
           <p:cNvSpPr>
             <a:spLocks noGrp="1"/>
           </p:cNvSpPr>
@@ -2949,8 +2597,8 @@
         </p:nvSpPr>
         <p:spPr>
           <a:xfrm>
-            <a:off x="4038600" y="6356350"/>
-            <a:ext cx="4114800" cy="365125"/>
+            <a:off x="3935006" y="6040005"/>
+            <a:ext cx="4009251" cy="346953"/>
           </a:xfrm>
           <a:prstGeom prst="rect">
             <a:avLst/>
@@ -2960,7 +2608,7 @@
           <a:bodyPr vert="horz" lIns="91440" tIns="45720" rIns="91440" bIns="45720" rtlCol="0" anchor="ctr"/>
           <a:lstStyle>
             <a:lvl1pPr algn="ctr">
-              <a:defRPr sz="1200">
+              <a:defRPr sz="1140">
                 <a:solidFill>
                   <a:schemeClr val="tx1">
                     <a:tint val="75000"/>
@@ -2976,13 +2624,7 @@
       </p:sp>
       <p:sp>
         <p:nvSpPr>
-          <p:cNvPr id="6" name="Slide Number Placeholder 5">
-            <a:extLst>
-              <a:ext uri="{FF2B5EF4-FFF2-40B4-BE49-F238E27FC236}">
-                <a16:creationId xmlns:a16="http://schemas.microsoft.com/office/drawing/2014/main" id="{A7038E71-5C68-23D9-EEFB-3DD7474D6B01}"/>
-              </a:ext>
-            </a:extLst>
-          </p:cNvPr>
+          <p:cNvPr id="6" name="Slide Number Placeholder 5"/>
           <p:cNvSpPr>
             <a:spLocks noGrp="1"/>
           </p:cNvSpPr>
@@ -2992,8 +2634,8 @@
         </p:nvSpPr>
         <p:spPr>
           <a:xfrm>
-            <a:off x="8610600" y="6356350"/>
-            <a:ext cx="2743200" cy="365125"/>
+            <a:off x="8389730" y="6040005"/>
+            <a:ext cx="2672834" cy="346953"/>
           </a:xfrm>
           <a:prstGeom prst="rect">
             <a:avLst/>
@@ -3003,7 +2645,7 @@
           <a:bodyPr vert="horz" lIns="91440" tIns="45720" rIns="91440" bIns="45720" rtlCol="0" anchor="ctr"/>
           <a:lstStyle>
             <a:lvl1pPr algn="r">
-              <a:defRPr sz="1200">
+              <a:defRPr sz="1140">
                 <a:solidFill>
                   <a:schemeClr val="tx1">
                     <a:tint val="75000"/>
@@ -3013,7 +2655,7 @@
             </a:lvl1pPr>
           </a:lstStyle>
           <a:p>
-            <a:fld id="{3E641AC2-74A6-0B45-AA7A-FDD9099B35B0}" type="slidenum">
+            <a:fld id="{AD889EE7-EA20-7649-8640-1575DCB12BE0}" type="slidenum">
               <a:rPr lang="en-DE" smtClean="0"/>
               <a:t>‹#›</a:t>
             </a:fld>
@@ -3024,27 +2666,27 @@
     </p:spTree>
     <p:extLst>
       <p:ext uri="{BB962C8B-B14F-4D97-AF65-F5344CB8AC3E}">
-        <p14:creationId xmlns:p14="http://schemas.microsoft.com/office/powerpoint/2010/main" val="2453101930"/>
+        <p14:creationId xmlns:p14="http://schemas.microsoft.com/office/powerpoint/2010/main" val="846084690"/>
       </p:ext>
     </p:extLst>
   </p:cSld>
   <p:clrMap bg1="lt1" tx1="dk1" bg2="lt2" tx2="dk2" accent1="accent1" accent2="accent2" accent3="accent3" accent4="accent4" accent5="accent5" accent6="accent6" hlink="hlink" folHlink="folHlink"/>
   <p:sldLayoutIdLst>
-    <p:sldLayoutId id="2147483649" r:id="rId1"/>
-    <p:sldLayoutId id="2147483650" r:id="rId2"/>
-    <p:sldLayoutId id="2147483651" r:id="rId3"/>
-    <p:sldLayoutId id="2147483652" r:id="rId4"/>
-    <p:sldLayoutId id="2147483653" r:id="rId5"/>
-    <p:sldLayoutId id="2147483654" r:id="rId6"/>
-    <p:sldLayoutId id="2147483655" r:id="rId7"/>
-    <p:sldLayoutId id="2147483656" r:id="rId8"/>
-    <p:sldLayoutId id="2147483657" r:id="rId9"/>
-    <p:sldLayoutId id="2147483658" r:id="rId10"/>
-    <p:sldLayoutId id="2147483659" r:id="rId11"/>
+    <p:sldLayoutId id="2147483673" r:id="rId1"/>
+    <p:sldLayoutId id="2147483674" r:id="rId2"/>
+    <p:sldLayoutId id="2147483675" r:id="rId3"/>
+    <p:sldLayoutId id="2147483676" r:id="rId4"/>
+    <p:sldLayoutId id="2147483677" r:id="rId5"/>
+    <p:sldLayoutId id="2147483678" r:id="rId6"/>
+    <p:sldLayoutId id="2147483679" r:id="rId7"/>
+    <p:sldLayoutId id="2147483680" r:id="rId8"/>
+    <p:sldLayoutId id="2147483681" r:id="rId9"/>
+    <p:sldLayoutId id="2147483682" r:id="rId10"/>
+    <p:sldLayoutId id="2147483683" r:id="rId11"/>
   </p:sldLayoutIdLst>
   <p:txStyles>
     <p:titleStyle>
-      <a:lvl1pPr algn="l" defTabSz="914400" rtl="0" eaLnBrk="1" latinLnBrk="0" hangingPunct="1">
+      <a:lvl1pPr algn="l" defTabSz="868863" rtl="0" eaLnBrk="1" latinLnBrk="0" hangingPunct="1">
         <a:lnSpc>
           <a:spcPct val="90000"/>
         </a:lnSpc>
@@ -3052,7 +2694,7 @@
           <a:spcPct val="0"/>
         </a:spcBef>
         <a:buNone/>
-        <a:defRPr sz="4400" kern="1200">
+        <a:defRPr sz="4181" kern="1200">
           <a:solidFill>
             <a:schemeClr val="tx1"/>
           </a:solidFill>
@@ -3063,16 +2705,16 @@
       </a:lvl1pPr>
     </p:titleStyle>
     <p:bodyStyle>
-      <a:lvl1pPr marL="228600" indent="-228600" algn="l" defTabSz="914400" rtl="0" eaLnBrk="1" latinLnBrk="0" hangingPunct="1">
+      <a:lvl1pPr marL="217216" indent="-217216" algn="l" defTabSz="868863" rtl="0" eaLnBrk="1" latinLnBrk="0" hangingPunct="1">
         <a:lnSpc>
           <a:spcPct val="90000"/>
         </a:lnSpc>
         <a:spcBef>
-          <a:spcPts val="1000"/>
+          <a:spcPts val="950"/>
         </a:spcBef>
         <a:buFont typeface="Arial" panose="020B0604020202020204" pitchFamily="34" charset="0"/>
         <a:buChar char="•"/>
-        <a:defRPr sz="2800" kern="1200">
+        <a:defRPr sz="2661" kern="1200">
           <a:solidFill>
             <a:schemeClr val="tx1"/>
           </a:solidFill>
@@ -3081,16 +2723,16 @@
           <a:cs typeface="+mn-cs"/>
         </a:defRPr>
       </a:lvl1pPr>
-      <a:lvl2pPr marL="685800" indent="-228600" algn="l" defTabSz="914400" rtl="0" eaLnBrk="1" latinLnBrk="0" hangingPunct="1">
+      <a:lvl2pPr marL="651647" indent="-217216" algn="l" defTabSz="868863" rtl="0" eaLnBrk="1" latinLnBrk="0" hangingPunct="1">
         <a:lnSpc>
           <a:spcPct val="90000"/>
         </a:lnSpc>
         <a:spcBef>
-          <a:spcPts val="500"/>
+          <a:spcPts val="475"/>
         </a:spcBef>
         <a:buFont typeface="Arial" panose="020B0604020202020204" pitchFamily="34" charset="0"/>
         <a:buChar char="•"/>
-        <a:defRPr sz="2400" kern="1200">
+        <a:defRPr sz="2280" kern="1200">
           <a:solidFill>
             <a:schemeClr val="tx1"/>
           </a:solidFill>
@@ -3099,16 +2741,16 @@
           <a:cs typeface="+mn-cs"/>
         </a:defRPr>
       </a:lvl2pPr>
-      <a:lvl3pPr marL="1143000" indent="-228600" algn="l" defTabSz="914400" rtl="0" eaLnBrk="1" latinLnBrk="0" hangingPunct="1">
+      <a:lvl3pPr marL="1086079" indent="-217216" algn="l" defTabSz="868863" rtl="0" eaLnBrk="1" latinLnBrk="0" hangingPunct="1">
         <a:lnSpc>
           <a:spcPct val="90000"/>
         </a:lnSpc>
         <a:spcBef>
-          <a:spcPts val="500"/>
+          <a:spcPts val="475"/>
         </a:spcBef>
         <a:buFont typeface="Arial" panose="020B0604020202020204" pitchFamily="34" charset="0"/>
         <a:buChar char="•"/>
-        <a:defRPr sz="2000" kern="1200">
+        <a:defRPr sz="1900" kern="1200">
           <a:solidFill>
             <a:schemeClr val="tx1"/>
           </a:solidFill>
@@ -3117,16 +2759,16 @@
           <a:cs typeface="+mn-cs"/>
         </a:defRPr>
       </a:lvl3pPr>
-      <a:lvl4pPr marL="1600200" indent="-228600" algn="l" defTabSz="914400" rtl="0" eaLnBrk="1" latinLnBrk="0" hangingPunct="1">
+      <a:lvl4pPr marL="1520510" indent="-217216" algn="l" defTabSz="868863" rtl="0" eaLnBrk="1" latinLnBrk="0" hangingPunct="1">
         <a:lnSpc>
           <a:spcPct val="90000"/>
         </a:lnSpc>
         <a:spcBef>
-          <a:spcPts val="500"/>
+          <a:spcPts val="475"/>
         </a:spcBef>
         <a:buFont typeface="Arial" panose="020B0604020202020204" pitchFamily="34" charset="0"/>
         <a:buChar char="•"/>
-        <a:defRPr sz="1800" kern="1200">
+        <a:defRPr sz="1710" kern="1200">
           <a:solidFill>
             <a:schemeClr val="tx1"/>
           </a:solidFill>
@@ -3135,16 +2777,16 @@
           <a:cs typeface="+mn-cs"/>
         </a:defRPr>
       </a:lvl4pPr>
-      <a:lvl5pPr marL="2057400" indent="-228600" algn="l" defTabSz="914400" rtl="0" eaLnBrk="1" latinLnBrk="0" hangingPunct="1">
+      <a:lvl5pPr marL="1954941" indent="-217216" algn="l" defTabSz="868863" rtl="0" eaLnBrk="1" latinLnBrk="0" hangingPunct="1">
         <a:lnSpc>
           <a:spcPct val="90000"/>
         </a:lnSpc>
         <a:spcBef>
-          <a:spcPts val="500"/>
+          <a:spcPts val="475"/>
         </a:spcBef>
         <a:buFont typeface="Arial" panose="020B0604020202020204" pitchFamily="34" charset="0"/>
         <a:buChar char="•"/>
-        <a:defRPr sz="1800" kern="1200">
+        <a:defRPr sz="1710" kern="1200">
           <a:solidFill>
             <a:schemeClr val="tx1"/>
           </a:solidFill>
@@ -3153,16 +2795,16 @@
           <a:cs typeface="+mn-cs"/>
         </a:defRPr>
       </a:lvl5pPr>
-      <a:lvl6pPr marL="2514600" indent="-228600" algn="l" defTabSz="914400" rtl="0" eaLnBrk="1" latinLnBrk="0" hangingPunct="1">
+      <a:lvl6pPr marL="2389373" indent="-217216" algn="l" defTabSz="868863" rtl="0" eaLnBrk="1" latinLnBrk="0" hangingPunct="1">
         <a:lnSpc>
           <a:spcPct val="90000"/>
         </a:lnSpc>
         <a:spcBef>
-          <a:spcPts val="500"/>
+          <a:spcPts val="475"/>
         </a:spcBef>
         <a:buFont typeface="Arial" panose="020B0604020202020204" pitchFamily="34" charset="0"/>
         <a:buChar char="•"/>
-        <a:defRPr sz="1800" kern="1200">
+        <a:defRPr sz="1710" kern="1200">
           <a:solidFill>
             <a:schemeClr val="tx1"/>
           </a:solidFill>
@@ -3171,16 +2813,16 @@
           <a:cs typeface="+mn-cs"/>
         </a:defRPr>
       </a:lvl6pPr>
-      <a:lvl7pPr marL="2971800" indent="-228600" algn="l" defTabSz="914400" rtl="0" eaLnBrk="1" latinLnBrk="0" hangingPunct="1">
+      <a:lvl7pPr marL="2823804" indent="-217216" algn="l" defTabSz="868863" rtl="0" eaLnBrk="1" latinLnBrk="0" hangingPunct="1">
         <a:lnSpc>
           <a:spcPct val="90000"/>
         </a:lnSpc>
         <a:spcBef>
-          <a:spcPts val="500"/>
+          <a:spcPts val="475"/>
         </a:spcBef>
         <a:buFont typeface="Arial" panose="020B0604020202020204" pitchFamily="34" charset="0"/>
         <a:buChar char="•"/>
-        <a:defRPr sz="1800" kern="1200">
+        <a:defRPr sz="1710" kern="1200">
           <a:solidFill>
             <a:schemeClr val="tx1"/>
           </a:solidFill>
@@ -3189,16 +2831,16 @@
           <a:cs typeface="+mn-cs"/>
         </a:defRPr>
       </a:lvl7pPr>
-      <a:lvl8pPr marL="3429000" indent="-228600" algn="l" defTabSz="914400" rtl="0" eaLnBrk="1" latinLnBrk="0" hangingPunct="1">
+      <a:lvl8pPr marL="3258236" indent="-217216" algn="l" defTabSz="868863" rtl="0" eaLnBrk="1" latinLnBrk="0" hangingPunct="1">
         <a:lnSpc>
           <a:spcPct val="90000"/>
         </a:lnSpc>
         <a:spcBef>
-          <a:spcPts val="500"/>
+          <a:spcPts val="475"/>
         </a:spcBef>
         <a:buFont typeface="Arial" panose="020B0604020202020204" pitchFamily="34" charset="0"/>
         <a:buChar char="•"/>
-        <a:defRPr sz="1800" kern="1200">
+        <a:defRPr sz="1710" kern="1200">
           <a:solidFill>
             <a:schemeClr val="tx1"/>
           </a:solidFill>
@@ -3207,16 +2849,16 @@
           <a:cs typeface="+mn-cs"/>
         </a:defRPr>
       </a:lvl8pPr>
-      <a:lvl9pPr marL="3886200" indent="-228600" algn="l" defTabSz="914400" rtl="0" eaLnBrk="1" latinLnBrk="0" hangingPunct="1">
+      <a:lvl9pPr marL="3692667" indent="-217216" algn="l" defTabSz="868863" rtl="0" eaLnBrk="1" latinLnBrk="0" hangingPunct="1">
         <a:lnSpc>
           <a:spcPct val="90000"/>
         </a:lnSpc>
         <a:spcBef>
-          <a:spcPts val="500"/>
+          <a:spcPts val="475"/>
         </a:spcBef>
         <a:buFont typeface="Arial" panose="020B0604020202020204" pitchFamily="34" charset="0"/>
         <a:buChar char="•"/>
-        <a:defRPr sz="1800" kern="1200">
+        <a:defRPr sz="1710" kern="1200">
           <a:solidFill>
             <a:schemeClr val="tx1"/>
           </a:solidFill>
@@ -3228,10 +2870,10 @@
     </p:bodyStyle>
     <p:otherStyle>
       <a:defPPr>
-        <a:defRPr lang="en-DE"/>
+        <a:defRPr lang="en-US"/>
       </a:defPPr>
-      <a:lvl1pPr marL="0" algn="l" defTabSz="914400" rtl="0" eaLnBrk="1" latinLnBrk="0" hangingPunct="1">
-        <a:defRPr sz="1800" kern="1200">
+      <a:lvl1pPr marL="0" algn="l" defTabSz="868863" rtl="0" eaLnBrk="1" latinLnBrk="0" hangingPunct="1">
+        <a:defRPr sz="1710" kern="1200">
           <a:solidFill>
             <a:schemeClr val="tx1"/>
           </a:solidFill>
@@ -3240,8 +2882,8 @@
           <a:cs typeface="+mn-cs"/>
         </a:defRPr>
       </a:lvl1pPr>
-      <a:lvl2pPr marL="457200" algn="l" defTabSz="914400" rtl="0" eaLnBrk="1" latinLnBrk="0" hangingPunct="1">
-        <a:defRPr sz="1800" kern="1200">
+      <a:lvl2pPr marL="434431" algn="l" defTabSz="868863" rtl="0" eaLnBrk="1" latinLnBrk="0" hangingPunct="1">
+        <a:defRPr sz="1710" kern="1200">
           <a:solidFill>
             <a:schemeClr val="tx1"/>
           </a:solidFill>
@@ -3250,8 +2892,8 @@
           <a:cs typeface="+mn-cs"/>
         </a:defRPr>
       </a:lvl2pPr>
-      <a:lvl3pPr marL="914400" algn="l" defTabSz="914400" rtl="0" eaLnBrk="1" latinLnBrk="0" hangingPunct="1">
-        <a:defRPr sz="1800" kern="1200">
+      <a:lvl3pPr marL="868863" algn="l" defTabSz="868863" rtl="0" eaLnBrk="1" latinLnBrk="0" hangingPunct="1">
+        <a:defRPr sz="1710" kern="1200">
           <a:solidFill>
             <a:schemeClr val="tx1"/>
           </a:solidFill>
@@ -3260,8 +2902,8 @@
           <a:cs typeface="+mn-cs"/>
         </a:defRPr>
       </a:lvl3pPr>
-      <a:lvl4pPr marL="1371600" algn="l" defTabSz="914400" rtl="0" eaLnBrk="1" latinLnBrk="0" hangingPunct="1">
-        <a:defRPr sz="1800" kern="1200">
+      <a:lvl4pPr marL="1303294" algn="l" defTabSz="868863" rtl="0" eaLnBrk="1" latinLnBrk="0" hangingPunct="1">
+        <a:defRPr sz="1710" kern="1200">
           <a:solidFill>
             <a:schemeClr val="tx1"/>
           </a:solidFill>
@@ -3270,8 +2912,8 @@
           <a:cs typeface="+mn-cs"/>
         </a:defRPr>
       </a:lvl4pPr>
-      <a:lvl5pPr marL="1828800" algn="l" defTabSz="914400" rtl="0" eaLnBrk="1" latinLnBrk="0" hangingPunct="1">
-        <a:defRPr sz="1800" kern="1200">
+      <a:lvl5pPr marL="1737726" algn="l" defTabSz="868863" rtl="0" eaLnBrk="1" latinLnBrk="0" hangingPunct="1">
+        <a:defRPr sz="1710" kern="1200">
           <a:solidFill>
             <a:schemeClr val="tx1"/>
           </a:solidFill>
@@ -3280,8 +2922,8 @@
           <a:cs typeface="+mn-cs"/>
         </a:defRPr>
       </a:lvl5pPr>
-      <a:lvl6pPr marL="2286000" algn="l" defTabSz="914400" rtl="0" eaLnBrk="1" latinLnBrk="0" hangingPunct="1">
-        <a:defRPr sz="1800" kern="1200">
+      <a:lvl6pPr marL="2172157" algn="l" defTabSz="868863" rtl="0" eaLnBrk="1" latinLnBrk="0" hangingPunct="1">
+        <a:defRPr sz="1710" kern="1200">
           <a:solidFill>
             <a:schemeClr val="tx1"/>
           </a:solidFill>
@@ -3290,8 +2932,8 @@
           <a:cs typeface="+mn-cs"/>
         </a:defRPr>
       </a:lvl6pPr>
-      <a:lvl7pPr marL="2743200" algn="l" defTabSz="914400" rtl="0" eaLnBrk="1" latinLnBrk="0" hangingPunct="1">
-        <a:defRPr sz="1800" kern="1200">
+      <a:lvl7pPr marL="2606589" algn="l" defTabSz="868863" rtl="0" eaLnBrk="1" latinLnBrk="0" hangingPunct="1">
+        <a:defRPr sz="1710" kern="1200">
           <a:solidFill>
             <a:schemeClr val="tx1"/>
           </a:solidFill>
@@ -3300,8 +2942,8 @@
           <a:cs typeface="+mn-cs"/>
         </a:defRPr>
       </a:lvl7pPr>
-      <a:lvl8pPr marL="3200400" algn="l" defTabSz="914400" rtl="0" eaLnBrk="1" latinLnBrk="0" hangingPunct="1">
-        <a:defRPr sz="1800" kern="1200">
+      <a:lvl8pPr marL="3041020" algn="l" defTabSz="868863" rtl="0" eaLnBrk="1" latinLnBrk="0" hangingPunct="1">
+        <a:defRPr sz="1710" kern="1200">
           <a:solidFill>
             <a:schemeClr val="tx1"/>
           </a:solidFill>
@@ -3310,8 +2952,8 @@
           <a:cs typeface="+mn-cs"/>
         </a:defRPr>
       </a:lvl8pPr>
-      <a:lvl9pPr marL="3657600" algn="l" defTabSz="914400" rtl="0" eaLnBrk="1" latinLnBrk="0" hangingPunct="1">
-        <a:defRPr sz="1800" kern="1200">
+      <a:lvl9pPr marL="3475452" algn="l" defTabSz="868863" rtl="0" eaLnBrk="1" latinLnBrk="0" hangingPunct="1">
+        <a:defRPr sz="1710" kern="1200">
           <a:solidFill>
             <a:schemeClr val="tx1"/>
           </a:solidFill>
@@ -3344,10 +2986,10 @@
       </p:grpSpPr>
       <p:pic>
         <p:nvPicPr>
-          <p:cNvPr id="5" name="Picture 4" descr="Chart, bar chart&#10;&#10;Description automatically generated">
+          <p:cNvPr id="9" name="Picture 8" descr="Chart, diagram&#10;&#10;Description automatically generated">
             <a:extLst>
               <a:ext uri="{FF2B5EF4-FFF2-40B4-BE49-F238E27FC236}">
-                <a16:creationId xmlns:a16="http://schemas.microsoft.com/office/drawing/2014/main" id="{6940465F-368D-B00F-36DC-B7A691AB152D}"/>
+                <a16:creationId xmlns:a16="http://schemas.microsoft.com/office/drawing/2014/main" id="{4F5BC723-8733-EE37-87CC-9366A0333704}"/>
               </a:ext>
             </a:extLst>
           </p:cNvPr>
@@ -3356,73 +2998,16 @@
           </p:cNvPicPr>
           <p:nvPr/>
         </p:nvPicPr>
-        <p:blipFill rotWithShape="1">
+        <p:blipFill>
           <a:blip r:embed="rId2"/>
-          <a:srcRect l="3859" r="13463"/>
-          <a:stretch/>
+          <a:stretch>
+            <a:fillRect/>
+          </a:stretch>
         </p:blipFill>
         <p:spPr>
           <a:xfrm>
-            <a:off x="747186" y="344314"/>
-            <a:ext cx="3259330" cy="3066140"/>
-          </a:xfrm>
-          <a:prstGeom prst="rect">
-            <a:avLst/>
-          </a:prstGeom>
-        </p:spPr>
-      </p:pic>
-      <p:pic>
-        <p:nvPicPr>
-          <p:cNvPr id="7" name="Picture 6" descr="Chart&#10;&#10;Description automatically generated">
-            <a:extLst>
-              <a:ext uri="{FF2B5EF4-FFF2-40B4-BE49-F238E27FC236}">
-                <a16:creationId xmlns:a16="http://schemas.microsoft.com/office/drawing/2014/main" id="{398E5608-31B2-8A06-C18C-46774BB1F13E}"/>
-              </a:ext>
-            </a:extLst>
-          </p:cNvPr>
-          <p:cNvPicPr>
-            <a:picLocks noChangeAspect="1"/>
-          </p:cNvPicPr>
-          <p:nvPr/>
-        </p:nvPicPr>
-        <p:blipFill rotWithShape="1">
-          <a:blip r:embed="rId3"/>
-          <a:srcRect l="3172" r="13290"/>
-          <a:stretch/>
-        </p:blipFill>
-        <p:spPr>
-          <a:xfrm>
-            <a:off x="720125" y="3802343"/>
-            <a:ext cx="3293279" cy="3066139"/>
-          </a:xfrm>
-          <a:prstGeom prst="rect">
-            <a:avLst/>
-          </a:prstGeom>
-        </p:spPr>
-      </p:pic>
-      <p:pic>
-        <p:nvPicPr>
-          <p:cNvPr id="9" name="Picture 8" descr="Chart, diagram&#10;&#10;Description automatically generated">
-            <a:extLst>
-              <a:ext uri="{FF2B5EF4-FFF2-40B4-BE49-F238E27FC236}">
-                <a16:creationId xmlns:a16="http://schemas.microsoft.com/office/drawing/2014/main" id="{78F47645-531B-76FC-1F52-84E783CA0ECF}"/>
-              </a:ext>
-            </a:extLst>
-          </p:cNvPr>
-          <p:cNvPicPr>
-            <a:picLocks noChangeAspect="1"/>
-          </p:cNvPicPr>
-          <p:nvPr/>
-        </p:nvPicPr>
-        <p:blipFill rotWithShape="1">
-          <a:blip r:embed="rId4"/>
-          <a:srcRect r="26402"/>
-          <a:stretch/>
-        </p:blipFill>
-        <p:spPr>
-          <a:xfrm>
-            <a:off x="5306371" y="141517"/>
-            <a:ext cx="2405871" cy="3268937"/>
+            <a:off x="5172284" y="402351"/>
+            <a:ext cx="2896625" cy="2896625"/>
           </a:xfrm>
           <a:prstGeom prst="rect">
             <a:avLst/>
@@ -3434,7 +3019,66 @@
           <p:cNvPr id="11" name="Picture 10" descr="Diagram&#10;&#10;Description automatically generated">
             <a:extLst>
               <a:ext uri="{FF2B5EF4-FFF2-40B4-BE49-F238E27FC236}">
-                <a16:creationId xmlns:a16="http://schemas.microsoft.com/office/drawing/2014/main" id="{B77F726D-6BC4-89D8-8C12-C120FE8E41C4}"/>
+                <a16:creationId xmlns:a16="http://schemas.microsoft.com/office/drawing/2014/main" id="{FF3DD600-1633-7116-1AA1-936D3C38C696}"/>
+              </a:ext>
+            </a:extLst>
+          </p:cNvPr>
+          <p:cNvPicPr>
+            <a:picLocks noChangeAspect="1"/>
+          </p:cNvPicPr>
+          <p:nvPr/>
+        </p:nvPicPr>
+        <p:blipFill>
+          <a:blip r:embed="rId3"/>
+          <a:stretch>
+            <a:fillRect/>
+          </a:stretch>
+        </p:blipFill>
+        <p:spPr>
+          <a:xfrm>
+            <a:off x="5172285" y="3535471"/>
+            <a:ext cx="2896625" cy="2896625"/>
+          </a:xfrm>
+          <a:prstGeom prst="rect">
+            <a:avLst/>
+          </a:prstGeom>
+        </p:spPr>
+      </p:pic>
+      <p:pic>
+        <p:nvPicPr>
+          <p:cNvPr id="13" name="Picture 12" descr="Chart, bar chart&#10;&#10;Description automatically generated">
+            <a:extLst>
+              <a:ext uri="{FF2B5EF4-FFF2-40B4-BE49-F238E27FC236}">
+                <a16:creationId xmlns:a16="http://schemas.microsoft.com/office/drawing/2014/main" id="{8A7EF382-9004-6F50-00E8-9304E2C3306B}"/>
+              </a:ext>
+            </a:extLst>
+          </p:cNvPr>
+          <p:cNvPicPr>
+            <a:picLocks noChangeAspect="1"/>
+          </p:cNvPicPr>
+          <p:nvPr/>
+        </p:nvPicPr>
+        <p:blipFill rotWithShape="1">
+          <a:blip r:embed="rId4"/>
+          <a:srcRect l="3327" r="13203"/>
+          <a:stretch/>
+        </p:blipFill>
+        <p:spPr>
+          <a:xfrm>
+            <a:off x="942738" y="362078"/>
+            <a:ext cx="3108562" cy="2896625"/>
+          </a:xfrm>
+          <a:prstGeom prst="rect">
+            <a:avLst/>
+          </a:prstGeom>
+        </p:spPr>
+      </p:pic>
+      <p:pic>
+        <p:nvPicPr>
+          <p:cNvPr id="15" name="Picture 14" descr="Chart, bar chart&#10;&#10;Description automatically generated">
+            <a:extLst>
+              <a:ext uri="{FF2B5EF4-FFF2-40B4-BE49-F238E27FC236}">
+                <a16:creationId xmlns:a16="http://schemas.microsoft.com/office/drawing/2014/main" id="{3ACABD99-CE5C-B962-9BFA-AEC5B06E6E1B}"/>
               </a:ext>
             </a:extLst>
           </p:cNvPr>
@@ -3445,13 +3089,13 @@
         </p:nvPicPr>
         <p:blipFill rotWithShape="1">
           <a:blip r:embed="rId5"/>
-          <a:srcRect r="26402"/>
+          <a:srcRect l="3327" r="13203"/>
           <a:stretch/>
         </p:blipFill>
         <p:spPr>
           <a:xfrm>
-            <a:off x="5306371" y="3599137"/>
-            <a:ext cx="2595541" cy="3268937"/>
+            <a:off x="942738" y="3535471"/>
+            <a:ext cx="3108562" cy="2896625"/>
           </a:xfrm>
           <a:prstGeom prst="rect">
             <a:avLst/>
@@ -3460,10 +3104,10 @@
       </p:pic>
       <p:sp>
         <p:nvSpPr>
-          <p:cNvPr id="12" name="TextBox 11">
+          <p:cNvPr id="16" name="TextBox 15">
             <a:extLst>
               <a:ext uri="{FF2B5EF4-FFF2-40B4-BE49-F238E27FC236}">
-                <a16:creationId xmlns:a16="http://schemas.microsoft.com/office/drawing/2014/main" id="{5786D578-1FEF-D602-214F-6FBA51BAE18A}"/>
+                <a16:creationId xmlns:a16="http://schemas.microsoft.com/office/drawing/2014/main" id="{E2F9FB8F-E229-AB9E-039D-E6415F5E335F}"/>
               </a:ext>
             </a:extLst>
           </p:cNvPr>
@@ -3472,8 +3116,8 @@
         </p:nvSpPr>
         <p:spPr>
           <a:xfrm>
-            <a:off x="1782405" y="141517"/>
-            <a:ext cx="1567543" cy="261610"/>
+            <a:off x="675636" y="804784"/>
+            <a:ext cx="420280" cy="231602"/>
           </a:xfrm>
           <a:prstGeom prst="rect">
             <a:avLst/>
@@ -3487,27 +3131,18 @@
           <a:lstStyle/>
           <a:p>
             <a:r>
-              <a:rPr lang="en-DE" sz="1100" dirty="0">
-                <a:solidFill>
-                  <a:schemeClr val="tx1">
-                    <a:lumMod val="75000"/>
-                    <a:lumOff val="25000"/>
-                  </a:schemeClr>
-                </a:solidFill>
-                <a:latin typeface="Helvetica" pitchFamily="2" charset="0"/>
-                <a:cs typeface="Arial" panose="020B0604020202020204" pitchFamily="34" charset="0"/>
-              </a:rPr>
-              <a:t>Experiment 1</a:t>
-            </a:r>
-          </a:p>
-        </p:txBody>
-      </p:sp>
-      <p:sp>
-        <p:nvSpPr>
-          <p:cNvPr id="13" name="TextBox 12">
+              <a:rPr lang="en-DE" sz="905" dirty="0"/>
+              <a:t>dLRI</a:t>
+            </a:r>
+          </a:p>
+        </p:txBody>
+      </p:sp>
+      <p:sp>
+        <p:nvSpPr>
+          <p:cNvPr id="17" name="TextBox 16">
             <a:extLst>
               <a:ext uri="{FF2B5EF4-FFF2-40B4-BE49-F238E27FC236}">
-                <a16:creationId xmlns:a16="http://schemas.microsoft.com/office/drawing/2014/main" id="{4BEE023B-BA9E-781E-FF52-C552AAF650B1}"/>
+                <a16:creationId xmlns:a16="http://schemas.microsoft.com/office/drawing/2014/main" id="{420F3FC7-E99C-D898-22D0-9715E097AE4C}"/>
               </a:ext>
             </a:extLst>
           </p:cNvPr>
@@ -3516,8 +3151,8 @@
         </p:nvSpPr>
         <p:spPr>
           <a:xfrm>
-            <a:off x="1782405" y="3575316"/>
-            <a:ext cx="1567543" cy="261610"/>
+            <a:off x="636287" y="1372287"/>
+            <a:ext cx="473851" cy="231602"/>
           </a:xfrm>
           <a:prstGeom prst="rect">
             <a:avLst/>
@@ -3531,85 +3166,18 @@
           <a:lstStyle/>
           <a:p>
             <a:r>
-              <a:rPr lang="en-DE" sz="1100" dirty="0">
-                <a:solidFill>
-                  <a:schemeClr val="tx1">
-                    <a:lumMod val="75000"/>
-                    <a:lumOff val="25000"/>
-                  </a:schemeClr>
-                </a:solidFill>
-                <a:latin typeface="Helvetica" pitchFamily="2" charset="0"/>
-                <a:cs typeface="Arial" panose="020B0604020202020204" pitchFamily="34" charset="0"/>
-              </a:rPr>
-              <a:t>Experiment 2</a:t>
-            </a:r>
-          </a:p>
-        </p:txBody>
-      </p:sp>
-      <p:pic>
-        <p:nvPicPr>
-          <p:cNvPr id="14" name="Picture 13" descr="Chart&#10;&#10;Description automatically generated">
+              <a:rPr lang="en-DE" sz="905" dirty="0"/>
+              <a:t>dfLRI</a:t>
+            </a:r>
+          </a:p>
+        </p:txBody>
+      </p:sp>
+      <p:sp>
+        <p:nvSpPr>
+          <p:cNvPr id="18" name="TextBox 17">
             <a:extLst>
               <a:ext uri="{FF2B5EF4-FFF2-40B4-BE49-F238E27FC236}">
-                <a16:creationId xmlns:a16="http://schemas.microsoft.com/office/drawing/2014/main" id="{6A010867-E924-A541-F9D8-7F7D8A362532}"/>
-              </a:ext>
-            </a:extLst>
-          </p:cNvPr>
-          <p:cNvPicPr>
-            <a:picLocks noChangeAspect="1"/>
-          </p:cNvPicPr>
-          <p:nvPr/>
-        </p:nvPicPr>
-        <p:blipFill rotWithShape="1">
-          <a:blip r:embed="rId3"/>
-          <a:srcRect l="86338" t="31377" r="949" b="44623"/>
-          <a:stretch/>
-        </p:blipFill>
-        <p:spPr>
-          <a:xfrm>
-            <a:off x="4119053" y="2452119"/>
-            <a:ext cx="1047721" cy="1538272"/>
-          </a:xfrm>
-          <a:prstGeom prst="rect">
-            <a:avLst/>
-          </a:prstGeom>
-        </p:spPr>
-      </p:pic>
-      <p:pic>
-        <p:nvPicPr>
-          <p:cNvPr id="15" name="Picture 14" descr="Diagram&#10;&#10;Description automatically generated">
-            <a:extLst>
-              <a:ext uri="{FF2B5EF4-FFF2-40B4-BE49-F238E27FC236}">
-                <a16:creationId xmlns:a16="http://schemas.microsoft.com/office/drawing/2014/main" id="{141D9CAF-1077-1513-1C66-B7522E1E143A}"/>
-              </a:ext>
-            </a:extLst>
-          </p:cNvPr>
-          <p:cNvPicPr>
-            <a:picLocks noChangeAspect="1"/>
-          </p:cNvPicPr>
-          <p:nvPr/>
-        </p:nvPicPr>
-        <p:blipFill rotWithShape="1">
-          <a:blip r:embed="rId5"/>
-          <a:srcRect l="71880" t="50273" b="36623"/>
-          <a:stretch/>
-        </p:blipFill>
-        <p:spPr>
-          <a:xfrm>
-            <a:off x="8300494" y="3221255"/>
-            <a:ext cx="1085181" cy="505720"/>
-          </a:xfrm>
-          <a:prstGeom prst="rect">
-            <a:avLst/>
-          </a:prstGeom>
-        </p:spPr>
-      </p:pic>
-      <p:sp>
-        <p:nvSpPr>
-          <p:cNvPr id="16" name="TextBox 15">
-            <a:extLst>
-              <a:ext uri="{FF2B5EF4-FFF2-40B4-BE49-F238E27FC236}">
-                <a16:creationId xmlns:a16="http://schemas.microsoft.com/office/drawing/2014/main" id="{1B06FD10-92D5-EA7E-950E-2C132BC93B69}"/>
+                <a16:creationId xmlns:a16="http://schemas.microsoft.com/office/drawing/2014/main" id="{294A4357-DB87-1FD8-B5FB-4628B14EBD8B}"/>
               </a:ext>
             </a:extLst>
           </p:cNvPr>
@@ -3618,7 +3186,217 @@
         </p:nvSpPr>
         <p:spPr>
           <a:xfrm>
-            <a:off x="14669" y="32505"/>
+            <a:off x="689858" y="1957251"/>
+            <a:ext cx="420280" cy="231602"/>
+          </a:xfrm>
+          <a:prstGeom prst="rect">
+            <a:avLst/>
+          </a:prstGeom>
+          <a:noFill/>
+        </p:spPr>
+        <p:txBody>
+          <a:bodyPr wrap="square" rtlCol="0">
+            <a:spAutoFit/>
+          </a:bodyPr>
+          <a:lstStyle/>
+          <a:p>
+            <a:r>
+              <a:rPr lang="en-DE" sz="905" dirty="0"/>
+              <a:t>fLRI</a:t>
+            </a:r>
+          </a:p>
+        </p:txBody>
+      </p:sp>
+      <p:sp>
+        <p:nvSpPr>
+          <p:cNvPr id="19" name="TextBox 18">
+            <a:extLst>
+              <a:ext uri="{FF2B5EF4-FFF2-40B4-BE49-F238E27FC236}">
+                <a16:creationId xmlns:a16="http://schemas.microsoft.com/office/drawing/2014/main" id="{DB3276C7-F372-E362-833B-01A39C7FAB6B}"/>
+              </a:ext>
+            </a:extLst>
+          </p:cNvPr>
+          <p:cNvSpPr txBox="1"/>
+          <p:nvPr/>
+        </p:nvSpPr>
+        <p:spPr>
+          <a:xfrm>
+            <a:off x="672012" y="2524755"/>
+            <a:ext cx="420280" cy="231602"/>
+          </a:xfrm>
+          <a:prstGeom prst="rect">
+            <a:avLst/>
+          </a:prstGeom>
+          <a:noFill/>
+        </p:spPr>
+        <p:txBody>
+          <a:bodyPr wrap="square" rtlCol="0">
+            <a:spAutoFit/>
+          </a:bodyPr>
+          <a:lstStyle/>
+          <a:p>
+            <a:r>
+              <a:rPr lang="en-DE" sz="905" dirty="0"/>
+              <a:t>fLRE</a:t>
+            </a:r>
+          </a:p>
+        </p:txBody>
+      </p:sp>
+      <p:sp>
+        <p:nvSpPr>
+          <p:cNvPr id="20" name="TextBox 19">
+            <a:extLst>
+              <a:ext uri="{FF2B5EF4-FFF2-40B4-BE49-F238E27FC236}">
+                <a16:creationId xmlns:a16="http://schemas.microsoft.com/office/drawing/2014/main" id="{9E2BAF17-033D-B176-B94D-93F7F90B3494}"/>
+              </a:ext>
+            </a:extLst>
+          </p:cNvPr>
+          <p:cNvSpPr txBox="1"/>
+          <p:nvPr/>
+        </p:nvSpPr>
+        <p:spPr>
+          <a:xfrm>
+            <a:off x="683444" y="3971670"/>
+            <a:ext cx="420280" cy="231602"/>
+          </a:xfrm>
+          <a:prstGeom prst="rect">
+            <a:avLst/>
+          </a:prstGeom>
+          <a:noFill/>
+        </p:spPr>
+        <p:txBody>
+          <a:bodyPr wrap="square" rtlCol="0">
+            <a:spAutoFit/>
+          </a:bodyPr>
+          <a:lstStyle/>
+          <a:p>
+            <a:r>
+              <a:rPr lang="en-DE" sz="905" dirty="0"/>
+              <a:t>dLRI</a:t>
+            </a:r>
+          </a:p>
+        </p:txBody>
+      </p:sp>
+      <p:sp>
+        <p:nvSpPr>
+          <p:cNvPr id="21" name="TextBox 20">
+            <a:extLst>
+              <a:ext uri="{FF2B5EF4-FFF2-40B4-BE49-F238E27FC236}">
+                <a16:creationId xmlns:a16="http://schemas.microsoft.com/office/drawing/2014/main" id="{7D6A86A1-396F-6217-169F-8366E3F709F2}"/>
+              </a:ext>
+            </a:extLst>
+          </p:cNvPr>
+          <p:cNvSpPr txBox="1"/>
+          <p:nvPr/>
+        </p:nvSpPr>
+        <p:spPr>
+          <a:xfrm>
+            <a:off x="644094" y="4539174"/>
+            <a:ext cx="473851" cy="231602"/>
+          </a:xfrm>
+          <a:prstGeom prst="rect">
+            <a:avLst/>
+          </a:prstGeom>
+          <a:noFill/>
+        </p:spPr>
+        <p:txBody>
+          <a:bodyPr wrap="square" rtlCol="0">
+            <a:spAutoFit/>
+          </a:bodyPr>
+          <a:lstStyle/>
+          <a:p>
+            <a:r>
+              <a:rPr lang="en-DE" sz="905" dirty="0"/>
+              <a:t>dfLRI</a:t>
+            </a:r>
+          </a:p>
+        </p:txBody>
+      </p:sp>
+      <p:sp>
+        <p:nvSpPr>
+          <p:cNvPr id="22" name="TextBox 21">
+            <a:extLst>
+              <a:ext uri="{FF2B5EF4-FFF2-40B4-BE49-F238E27FC236}">
+                <a16:creationId xmlns:a16="http://schemas.microsoft.com/office/drawing/2014/main" id="{C9BE50C8-8181-D460-D1F5-6A1CC7AE3243}"/>
+              </a:ext>
+            </a:extLst>
+          </p:cNvPr>
+          <p:cNvSpPr txBox="1"/>
+          <p:nvPr/>
+        </p:nvSpPr>
+        <p:spPr>
+          <a:xfrm>
+            <a:off x="697666" y="5124138"/>
+            <a:ext cx="420280" cy="231602"/>
+          </a:xfrm>
+          <a:prstGeom prst="rect">
+            <a:avLst/>
+          </a:prstGeom>
+          <a:noFill/>
+        </p:spPr>
+        <p:txBody>
+          <a:bodyPr wrap="square" rtlCol="0">
+            <a:spAutoFit/>
+          </a:bodyPr>
+          <a:lstStyle/>
+          <a:p>
+            <a:r>
+              <a:rPr lang="en-DE" sz="905" dirty="0"/>
+              <a:t>fLRI</a:t>
+            </a:r>
+          </a:p>
+        </p:txBody>
+      </p:sp>
+      <p:sp>
+        <p:nvSpPr>
+          <p:cNvPr id="23" name="TextBox 22">
+            <a:extLst>
+              <a:ext uri="{FF2B5EF4-FFF2-40B4-BE49-F238E27FC236}">
+                <a16:creationId xmlns:a16="http://schemas.microsoft.com/office/drawing/2014/main" id="{15C52329-9C34-1801-5484-896CBDBA9A06}"/>
+              </a:ext>
+            </a:extLst>
+          </p:cNvPr>
+          <p:cNvSpPr txBox="1"/>
+          <p:nvPr/>
+        </p:nvSpPr>
+        <p:spPr>
+          <a:xfrm>
+            <a:off x="679820" y="5691641"/>
+            <a:ext cx="420280" cy="231602"/>
+          </a:xfrm>
+          <a:prstGeom prst="rect">
+            <a:avLst/>
+          </a:prstGeom>
+          <a:noFill/>
+        </p:spPr>
+        <p:txBody>
+          <a:bodyPr wrap="square" rtlCol="0">
+            <a:spAutoFit/>
+          </a:bodyPr>
+          <a:lstStyle/>
+          <a:p>
+            <a:r>
+              <a:rPr lang="en-DE" sz="905" dirty="0"/>
+              <a:t>fLRE</a:t>
+            </a:r>
+          </a:p>
+        </p:txBody>
+      </p:sp>
+      <p:sp>
+        <p:nvSpPr>
+          <p:cNvPr id="24" name="TextBox 1">
+            <a:extLst>
+              <a:ext uri="{FF2B5EF4-FFF2-40B4-BE49-F238E27FC236}">
+                <a16:creationId xmlns:a16="http://schemas.microsoft.com/office/drawing/2014/main" id="{488B09EE-60B8-FB23-5919-44EA9D90C00F}"/>
+              </a:ext>
+            </a:extLst>
+          </p:cNvPr>
+          <p:cNvSpPr txBox="1"/>
+          <p:nvPr/>
+        </p:nvSpPr>
+        <p:spPr>
+          <a:xfrm>
+            <a:off x="297040" y="78462"/>
             <a:ext cx="592920" cy="780840"/>
           </a:xfrm>
           <a:prstGeom prst="rect">
@@ -3629,11 +3407,87 @@
             <a:noFill/>
           </a:ln>
         </p:spPr>
+        <p:style>
+          <a:lnRef idx="0">
+            <a:scrgbClr r="0" g="0" b="0"/>
+          </a:lnRef>
+          <a:fillRef idx="0">
+            <a:scrgbClr r="0" g="0" b="0"/>
+          </a:fillRef>
+          <a:effectRef idx="0">
+            <a:scrgbClr r="0" g="0" b="0"/>
+          </a:effectRef>
+          <a:fontRef idx="major"/>
+        </p:style>
         <p:txBody>
           <a:bodyPr lIns="90000" tIns="45000" rIns="90000" bIns="45000" anchor="t">
             <a:noAutofit/>
           </a:bodyPr>
-          <a:lstStyle/>
+          <a:lstStyle>
+            <a:lvl1pPr>
+              <a:defRPr>
+                <a:latin typeface="+mj-lt"/>
+                <a:ea typeface="+mj-ea"/>
+                <a:cs typeface="+mj-cs"/>
+              </a:defRPr>
+            </a:lvl1pPr>
+            <a:lvl2pPr>
+              <a:defRPr>
+                <a:latin typeface="+mj-lt"/>
+                <a:ea typeface="+mj-ea"/>
+                <a:cs typeface="+mj-cs"/>
+              </a:defRPr>
+            </a:lvl2pPr>
+            <a:lvl3pPr>
+              <a:defRPr>
+                <a:latin typeface="+mj-lt"/>
+                <a:ea typeface="+mj-ea"/>
+                <a:cs typeface="+mj-cs"/>
+              </a:defRPr>
+            </a:lvl3pPr>
+            <a:lvl4pPr>
+              <a:defRPr>
+                <a:latin typeface="+mj-lt"/>
+                <a:ea typeface="+mj-ea"/>
+                <a:cs typeface="+mj-cs"/>
+              </a:defRPr>
+            </a:lvl4pPr>
+            <a:lvl5pPr>
+              <a:defRPr>
+                <a:latin typeface="+mj-lt"/>
+                <a:ea typeface="+mj-ea"/>
+                <a:cs typeface="+mj-cs"/>
+              </a:defRPr>
+            </a:lvl5pPr>
+            <a:lvl6pPr>
+              <a:defRPr>
+                <a:latin typeface="+mj-lt"/>
+                <a:ea typeface="+mj-ea"/>
+                <a:cs typeface="+mj-cs"/>
+              </a:defRPr>
+            </a:lvl6pPr>
+            <a:lvl7pPr>
+              <a:defRPr>
+                <a:latin typeface="+mj-lt"/>
+                <a:ea typeface="+mj-ea"/>
+                <a:cs typeface="+mj-cs"/>
+              </a:defRPr>
+            </a:lvl7pPr>
+            <a:lvl8pPr>
+              <a:defRPr>
+                <a:latin typeface="+mj-lt"/>
+                <a:ea typeface="+mj-ea"/>
+                <a:cs typeface="+mj-cs"/>
+              </a:defRPr>
+            </a:lvl8pPr>
+            <a:lvl9pPr>
+              <a:defRPr>
+                <a:latin typeface="+mj-lt"/>
+                <a:ea typeface="+mj-ea"/>
+                <a:cs typeface="+mj-cs"/>
+              </a:defRPr>
+            </a:lvl9pPr>
+          </a:lstStyle>
           <a:p>
             <a:r>
               <a:rPr lang="en-US" sz="2340" b="1" strike="noStrike" spc="-1" dirty="0">
@@ -3649,10 +3503,10 @@
       </p:sp>
       <p:sp>
         <p:nvSpPr>
-          <p:cNvPr id="17" name="TextBox 16">
+          <p:cNvPr id="25" name="TextBox 2">
             <a:extLst>
               <a:ext uri="{FF2B5EF4-FFF2-40B4-BE49-F238E27FC236}">
-                <a16:creationId xmlns:a16="http://schemas.microsoft.com/office/drawing/2014/main" id="{CC092A27-E772-77AC-2215-5FA7D47EA115}"/>
+                <a16:creationId xmlns:a16="http://schemas.microsoft.com/office/drawing/2014/main" id="{B770AA5E-BF22-FC7E-7876-5416DE07CB7B}"/>
               </a:ext>
             </a:extLst>
           </p:cNvPr>
@@ -3661,7 +3515,7 @@
         </p:nvSpPr>
         <p:spPr>
           <a:xfrm>
-            <a:off x="14669" y="3635373"/>
+            <a:off x="297040" y="3297902"/>
             <a:ext cx="592920" cy="780840"/>
           </a:xfrm>
           <a:prstGeom prst="rect">
@@ -3672,11 +3526,87 @@
             <a:noFill/>
           </a:ln>
         </p:spPr>
+        <p:style>
+          <a:lnRef idx="0">
+            <a:scrgbClr r="0" g="0" b="0"/>
+          </a:lnRef>
+          <a:fillRef idx="0">
+            <a:scrgbClr r="0" g="0" b="0"/>
+          </a:fillRef>
+          <a:effectRef idx="0">
+            <a:scrgbClr r="0" g="0" b="0"/>
+          </a:effectRef>
+          <a:fontRef idx="major"/>
+        </p:style>
         <p:txBody>
           <a:bodyPr lIns="90000" tIns="45000" rIns="90000" bIns="45000" anchor="t">
             <a:noAutofit/>
           </a:bodyPr>
-          <a:lstStyle/>
+          <a:lstStyle>
+            <a:lvl1pPr>
+              <a:defRPr>
+                <a:latin typeface="+mj-lt"/>
+                <a:ea typeface="+mj-ea"/>
+                <a:cs typeface="+mj-cs"/>
+              </a:defRPr>
+            </a:lvl1pPr>
+            <a:lvl2pPr>
+              <a:defRPr>
+                <a:latin typeface="+mj-lt"/>
+                <a:ea typeface="+mj-ea"/>
+                <a:cs typeface="+mj-cs"/>
+              </a:defRPr>
+            </a:lvl2pPr>
+            <a:lvl3pPr>
+              <a:defRPr>
+                <a:latin typeface="+mj-lt"/>
+                <a:ea typeface="+mj-ea"/>
+                <a:cs typeface="+mj-cs"/>
+              </a:defRPr>
+            </a:lvl3pPr>
+            <a:lvl4pPr>
+              <a:defRPr>
+                <a:latin typeface="+mj-lt"/>
+                <a:ea typeface="+mj-ea"/>
+                <a:cs typeface="+mj-cs"/>
+              </a:defRPr>
+            </a:lvl4pPr>
+            <a:lvl5pPr>
+              <a:defRPr>
+                <a:latin typeface="+mj-lt"/>
+                <a:ea typeface="+mj-ea"/>
+                <a:cs typeface="+mj-cs"/>
+              </a:defRPr>
+            </a:lvl5pPr>
+            <a:lvl6pPr>
+              <a:defRPr>
+                <a:latin typeface="+mj-lt"/>
+                <a:ea typeface="+mj-ea"/>
+                <a:cs typeface="+mj-cs"/>
+              </a:defRPr>
+            </a:lvl6pPr>
+            <a:lvl7pPr>
+              <a:defRPr>
+                <a:latin typeface="+mj-lt"/>
+                <a:ea typeface="+mj-ea"/>
+                <a:cs typeface="+mj-cs"/>
+              </a:defRPr>
+            </a:lvl7pPr>
+            <a:lvl8pPr>
+              <a:defRPr>
+                <a:latin typeface="+mj-lt"/>
+                <a:ea typeface="+mj-ea"/>
+                <a:cs typeface="+mj-cs"/>
+              </a:defRPr>
+            </a:lvl8pPr>
+            <a:lvl9pPr>
+              <a:defRPr>
+                <a:latin typeface="+mj-lt"/>
+                <a:ea typeface="+mj-ea"/>
+                <a:cs typeface="+mj-cs"/>
+              </a:defRPr>
+            </a:lvl9pPr>
+          </a:lstStyle>
           <a:p>
             <a:r>
               <a:rPr lang="en-US" sz="2340" b="1" spc="-1" dirty="0">
@@ -3698,10 +3628,10 @@
       </p:sp>
       <p:sp>
         <p:nvSpPr>
-          <p:cNvPr id="18" name="TextBox 17">
+          <p:cNvPr id="27" name="TextBox 4">
             <a:extLst>
               <a:ext uri="{FF2B5EF4-FFF2-40B4-BE49-F238E27FC236}">
-                <a16:creationId xmlns:a16="http://schemas.microsoft.com/office/drawing/2014/main" id="{42CEB45D-71D6-5287-E8BB-5C3C076B4EBF}"/>
+                <a16:creationId xmlns:a16="http://schemas.microsoft.com/office/drawing/2014/main" id="{B28CD3E7-896F-9EA8-C1C2-57851D260C3A}"/>
               </a:ext>
             </a:extLst>
           </p:cNvPr>
@@ -3710,7 +3640,7 @@
         </p:nvSpPr>
         <p:spPr>
           <a:xfrm>
-            <a:off x="5082266" y="3635373"/>
+            <a:off x="4711881" y="139745"/>
             <a:ext cx="592920" cy="780840"/>
           </a:xfrm>
           <a:prstGeom prst="rect">
@@ -3721,17 +3651,93 @@
             <a:noFill/>
           </a:ln>
         </p:spPr>
+        <p:style>
+          <a:lnRef idx="0">
+            <a:scrgbClr r="0" g="0" b="0"/>
+          </a:lnRef>
+          <a:fillRef idx="0">
+            <a:scrgbClr r="0" g="0" b="0"/>
+          </a:fillRef>
+          <a:effectRef idx="0">
+            <a:scrgbClr r="0" g="0" b="0"/>
+          </a:effectRef>
+          <a:fontRef idx="major"/>
+        </p:style>
         <p:txBody>
           <a:bodyPr lIns="90000" tIns="45000" rIns="90000" bIns="45000" anchor="t">
             <a:noAutofit/>
           </a:bodyPr>
-          <a:lstStyle/>
+          <a:lstStyle>
+            <a:lvl1pPr>
+              <a:defRPr>
+                <a:latin typeface="+mj-lt"/>
+                <a:ea typeface="+mj-ea"/>
+                <a:cs typeface="+mj-cs"/>
+              </a:defRPr>
+            </a:lvl1pPr>
+            <a:lvl2pPr>
+              <a:defRPr>
+                <a:latin typeface="+mj-lt"/>
+                <a:ea typeface="+mj-ea"/>
+                <a:cs typeface="+mj-cs"/>
+              </a:defRPr>
+            </a:lvl2pPr>
+            <a:lvl3pPr>
+              <a:defRPr>
+                <a:latin typeface="+mj-lt"/>
+                <a:ea typeface="+mj-ea"/>
+                <a:cs typeface="+mj-cs"/>
+              </a:defRPr>
+            </a:lvl3pPr>
+            <a:lvl4pPr>
+              <a:defRPr>
+                <a:latin typeface="+mj-lt"/>
+                <a:ea typeface="+mj-ea"/>
+                <a:cs typeface="+mj-cs"/>
+              </a:defRPr>
+            </a:lvl4pPr>
+            <a:lvl5pPr>
+              <a:defRPr>
+                <a:latin typeface="+mj-lt"/>
+                <a:ea typeface="+mj-ea"/>
+                <a:cs typeface="+mj-cs"/>
+              </a:defRPr>
+            </a:lvl5pPr>
+            <a:lvl6pPr>
+              <a:defRPr>
+                <a:latin typeface="+mj-lt"/>
+                <a:ea typeface="+mj-ea"/>
+                <a:cs typeface="+mj-cs"/>
+              </a:defRPr>
+            </a:lvl6pPr>
+            <a:lvl7pPr>
+              <a:defRPr>
+                <a:latin typeface="+mj-lt"/>
+                <a:ea typeface="+mj-ea"/>
+                <a:cs typeface="+mj-cs"/>
+              </a:defRPr>
+            </a:lvl7pPr>
+            <a:lvl8pPr>
+              <a:defRPr>
+                <a:latin typeface="+mj-lt"/>
+                <a:ea typeface="+mj-ea"/>
+                <a:cs typeface="+mj-cs"/>
+              </a:defRPr>
+            </a:lvl8pPr>
+            <a:lvl9pPr>
+              <a:defRPr>
+                <a:latin typeface="+mj-lt"/>
+                <a:ea typeface="+mj-ea"/>
+                <a:cs typeface="+mj-cs"/>
+              </a:defRPr>
+            </a:lvl9pPr>
+          </a:lstStyle>
           <a:p>
             <a:r>
               <a:rPr lang="en-US" sz="2340" b="1" spc="-1" dirty="0">
                 <a:latin typeface="Arial"/>
               </a:rPr>
-              <a:t>d)</a:t>
+              <a:t>c)</a:t>
             </a:r>
             <a:endParaRPr lang="en-US" sz="2340" b="0" strike="noStrike" spc="-1" dirty="0">
               <a:latin typeface="Arial"/>
@@ -3739,12 +3745,41 @@
           </a:p>
         </p:txBody>
       </p:sp>
-      <p:sp>
-        <p:nvSpPr>
-          <p:cNvPr id="19" name="TextBox 18">
+      <p:pic>
+        <p:nvPicPr>
+          <p:cNvPr id="28" name="Picture 27" descr="Chart, bar chart&#10;&#10;Description automatically generated">
             <a:extLst>
               <a:ext uri="{FF2B5EF4-FFF2-40B4-BE49-F238E27FC236}">
-                <a16:creationId xmlns:a16="http://schemas.microsoft.com/office/drawing/2014/main" id="{920FAB69-001B-83D0-5803-4AAFB6D7F6BC}"/>
+                <a16:creationId xmlns:a16="http://schemas.microsoft.com/office/drawing/2014/main" id="{F4465F28-9592-9F36-A4BE-523070478820}"/>
+              </a:ext>
+            </a:extLst>
+          </p:cNvPr>
+          <p:cNvPicPr>
+            <a:picLocks noChangeAspect="1"/>
+          </p:cNvPicPr>
+          <p:nvPr/>
+        </p:nvPicPr>
+        <p:blipFill rotWithShape="1">
+          <a:blip r:embed="rId4"/>
+          <a:srcRect l="85093" t="33098" r="243" b="36211"/>
+          <a:stretch/>
+        </p:blipFill>
+        <p:spPr>
+          <a:xfrm>
+            <a:off x="3957774" y="2730677"/>
+            <a:ext cx="886623" cy="1443340"/>
+          </a:xfrm>
+          <a:prstGeom prst="rect">
+            <a:avLst/>
+          </a:prstGeom>
+        </p:spPr>
+      </p:pic>
+      <p:sp>
+        <p:nvSpPr>
+          <p:cNvPr id="26" name="TextBox 3">
+            <a:extLst>
+              <a:ext uri="{FF2B5EF4-FFF2-40B4-BE49-F238E27FC236}">
+                <a16:creationId xmlns:a16="http://schemas.microsoft.com/office/drawing/2014/main" id="{7C52CB30-CB1C-08F1-0133-971031238197}"/>
               </a:ext>
             </a:extLst>
           </p:cNvPr>
@@ -3753,7 +3788,7 @@
         </p:nvSpPr>
         <p:spPr>
           <a:xfrm>
-            <a:off x="5097256" y="32505"/>
+            <a:off x="4711881" y="3596894"/>
             <a:ext cx="592920" cy="780840"/>
           </a:xfrm>
           <a:prstGeom prst="rect">
@@ -3764,17 +3799,93 @@
             <a:noFill/>
           </a:ln>
         </p:spPr>
+        <p:style>
+          <a:lnRef idx="0">
+            <a:scrgbClr r="0" g="0" b="0"/>
+          </a:lnRef>
+          <a:fillRef idx="0">
+            <a:scrgbClr r="0" g="0" b="0"/>
+          </a:fillRef>
+          <a:effectRef idx="0">
+            <a:scrgbClr r="0" g="0" b="0"/>
+          </a:effectRef>
+          <a:fontRef idx="major"/>
+        </p:style>
         <p:txBody>
           <a:bodyPr lIns="90000" tIns="45000" rIns="90000" bIns="45000" anchor="t">
             <a:noAutofit/>
           </a:bodyPr>
-          <a:lstStyle/>
+          <a:lstStyle>
+            <a:lvl1pPr>
+              <a:defRPr>
+                <a:latin typeface="+mj-lt"/>
+                <a:ea typeface="+mj-ea"/>
+                <a:cs typeface="+mj-cs"/>
+              </a:defRPr>
+            </a:lvl1pPr>
+            <a:lvl2pPr>
+              <a:defRPr>
+                <a:latin typeface="+mj-lt"/>
+                <a:ea typeface="+mj-ea"/>
+                <a:cs typeface="+mj-cs"/>
+              </a:defRPr>
+            </a:lvl2pPr>
+            <a:lvl3pPr>
+              <a:defRPr>
+                <a:latin typeface="+mj-lt"/>
+                <a:ea typeface="+mj-ea"/>
+                <a:cs typeface="+mj-cs"/>
+              </a:defRPr>
+            </a:lvl3pPr>
+            <a:lvl4pPr>
+              <a:defRPr>
+                <a:latin typeface="+mj-lt"/>
+                <a:ea typeface="+mj-ea"/>
+                <a:cs typeface="+mj-cs"/>
+              </a:defRPr>
+            </a:lvl4pPr>
+            <a:lvl5pPr>
+              <a:defRPr>
+                <a:latin typeface="+mj-lt"/>
+                <a:ea typeface="+mj-ea"/>
+                <a:cs typeface="+mj-cs"/>
+              </a:defRPr>
+            </a:lvl5pPr>
+            <a:lvl6pPr>
+              <a:defRPr>
+                <a:latin typeface="+mj-lt"/>
+                <a:ea typeface="+mj-ea"/>
+                <a:cs typeface="+mj-cs"/>
+              </a:defRPr>
+            </a:lvl6pPr>
+            <a:lvl7pPr>
+              <a:defRPr>
+                <a:latin typeface="+mj-lt"/>
+                <a:ea typeface="+mj-ea"/>
+                <a:cs typeface="+mj-cs"/>
+              </a:defRPr>
+            </a:lvl7pPr>
+            <a:lvl8pPr>
+              <a:defRPr>
+                <a:latin typeface="+mj-lt"/>
+                <a:ea typeface="+mj-ea"/>
+                <a:cs typeface="+mj-cs"/>
+              </a:defRPr>
+            </a:lvl8pPr>
+            <a:lvl9pPr>
+              <a:defRPr>
+                <a:latin typeface="+mj-lt"/>
+                <a:ea typeface="+mj-ea"/>
+                <a:cs typeface="+mj-cs"/>
+              </a:defRPr>
+            </a:lvl9pPr>
+          </a:lstStyle>
           <a:p>
             <a:r>
               <a:rPr lang="en-US" sz="2340" b="1" spc="-1" dirty="0">
                 <a:latin typeface="Arial"/>
               </a:rPr>
-              <a:t>c)</a:t>
+              <a:t>d)</a:t>
             </a:r>
             <a:endParaRPr lang="en-US" sz="2340" b="0" strike="noStrike" spc="-1" dirty="0">
               <a:latin typeface="Arial"/>
@@ -3782,322 +3893,10 @@
           </a:p>
         </p:txBody>
       </p:sp>
-      <p:sp>
-        <p:nvSpPr>
-          <p:cNvPr id="22" name="TextBox 21">
-            <a:extLst>
-              <a:ext uri="{FF2B5EF4-FFF2-40B4-BE49-F238E27FC236}">
-                <a16:creationId xmlns:a16="http://schemas.microsoft.com/office/drawing/2014/main" id="{8744EBA4-D797-0F69-C454-1A6864D6EB2C}"/>
-              </a:ext>
-            </a:extLst>
-          </p:cNvPr>
-          <p:cNvSpPr txBox="1"/>
-          <p:nvPr/>
-        </p:nvSpPr>
-        <p:spPr>
-          <a:xfrm>
-            <a:off x="223665" y="559165"/>
-            <a:ext cx="589304" cy="369332"/>
-          </a:xfrm>
-          <a:prstGeom prst="rect">
-            <a:avLst/>
-          </a:prstGeom>
-          <a:noFill/>
-        </p:spPr>
-        <p:txBody>
-          <a:bodyPr wrap="square" rtlCol="0">
-            <a:spAutoFit/>
-          </a:bodyPr>
-          <a:lstStyle/>
-          <a:p>
-            <a:r>
-              <a:rPr lang="en-DE" dirty="0"/>
-              <a:t>dLRI</a:t>
-            </a:r>
-          </a:p>
-        </p:txBody>
-      </p:sp>
-      <p:sp>
-        <p:nvSpPr>
-          <p:cNvPr id="23" name="TextBox 22">
-            <a:extLst>
-              <a:ext uri="{FF2B5EF4-FFF2-40B4-BE49-F238E27FC236}">
-                <a16:creationId xmlns:a16="http://schemas.microsoft.com/office/drawing/2014/main" id="{E15C0791-0908-FE41-3928-CAFE32BA8245}"/>
-              </a:ext>
-            </a:extLst>
-          </p:cNvPr>
-          <p:cNvSpPr txBox="1"/>
-          <p:nvPr/>
-        </p:nvSpPr>
-        <p:spPr>
-          <a:xfrm>
-            <a:off x="153214" y="1205234"/>
-            <a:ext cx="664420" cy="369332"/>
-          </a:xfrm>
-          <a:prstGeom prst="rect">
-            <a:avLst/>
-          </a:prstGeom>
-          <a:noFill/>
-        </p:spPr>
-        <p:txBody>
-          <a:bodyPr wrap="square" rtlCol="0">
-            <a:spAutoFit/>
-          </a:bodyPr>
-          <a:lstStyle/>
-          <a:p>
-            <a:r>
-              <a:rPr lang="en-DE" dirty="0"/>
-              <a:t>dfLRI</a:t>
-            </a:r>
-          </a:p>
-        </p:txBody>
-      </p:sp>
-      <p:sp>
-        <p:nvSpPr>
-          <p:cNvPr id="24" name="TextBox 23">
-            <a:extLst>
-              <a:ext uri="{FF2B5EF4-FFF2-40B4-BE49-F238E27FC236}">
-                <a16:creationId xmlns:a16="http://schemas.microsoft.com/office/drawing/2014/main" id="{8E4FAF0C-AFB3-057E-0B39-CE273D246F74}"/>
-              </a:ext>
-            </a:extLst>
-          </p:cNvPr>
-          <p:cNvSpPr txBox="1"/>
-          <p:nvPr/>
-        </p:nvSpPr>
-        <p:spPr>
-          <a:xfrm>
-            <a:off x="279157" y="1851303"/>
-            <a:ext cx="589304" cy="369332"/>
-          </a:xfrm>
-          <a:prstGeom prst="rect">
-            <a:avLst/>
-          </a:prstGeom>
-          <a:noFill/>
-        </p:spPr>
-        <p:txBody>
-          <a:bodyPr wrap="square" rtlCol="0">
-            <a:spAutoFit/>
-          </a:bodyPr>
-          <a:lstStyle/>
-          <a:p>
-            <a:r>
-              <a:rPr lang="en-DE" dirty="0"/>
-              <a:t>fLRI</a:t>
-            </a:r>
-          </a:p>
-        </p:txBody>
-      </p:sp>
-      <p:sp>
-        <p:nvSpPr>
-          <p:cNvPr id="25" name="TextBox 24">
-            <a:extLst>
-              <a:ext uri="{FF2B5EF4-FFF2-40B4-BE49-F238E27FC236}">
-                <a16:creationId xmlns:a16="http://schemas.microsoft.com/office/drawing/2014/main" id="{ABF3ED4F-CB5D-91FF-372E-7295A7162208}"/>
-              </a:ext>
-            </a:extLst>
-          </p:cNvPr>
-          <p:cNvSpPr txBox="1"/>
-          <p:nvPr/>
-        </p:nvSpPr>
-        <p:spPr>
-          <a:xfrm>
-            <a:off x="239689" y="2508648"/>
-            <a:ext cx="589304" cy="369332"/>
-          </a:xfrm>
-          <a:prstGeom prst="rect">
-            <a:avLst/>
-          </a:prstGeom>
-          <a:noFill/>
-        </p:spPr>
-        <p:txBody>
-          <a:bodyPr wrap="square" rtlCol="0">
-            <a:spAutoFit/>
-          </a:bodyPr>
-          <a:lstStyle/>
-          <a:p>
-            <a:r>
-              <a:rPr lang="en-DE" dirty="0"/>
-              <a:t>fLRE</a:t>
-            </a:r>
-          </a:p>
-        </p:txBody>
-      </p:sp>
-      <p:sp>
-        <p:nvSpPr>
-          <p:cNvPr id="26" name="TextBox 25">
-            <a:extLst>
-              <a:ext uri="{FF2B5EF4-FFF2-40B4-BE49-F238E27FC236}">
-                <a16:creationId xmlns:a16="http://schemas.microsoft.com/office/drawing/2014/main" id="{A6EC2BAC-1713-12FB-8589-1EECE18BEED0}"/>
-              </a:ext>
-            </a:extLst>
-          </p:cNvPr>
-          <p:cNvSpPr txBox="1"/>
-          <p:nvPr/>
-        </p:nvSpPr>
-        <p:spPr>
-          <a:xfrm>
-            <a:off x="223665" y="4027262"/>
-            <a:ext cx="589304" cy="369332"/>
-          </a:xfrm>
-          <a:prstGeom prst="rect">
-            <a:avLst/>
-          </a:prstGeom>
-          <a:noFill/>
-        </p:spPr>
-        <p:txBody>
-          <a:bodyPr wrap="square" rtlCol="0">
-            <a:spAutoFit/>
-          </a:bodyPr>
-          <a:lstStyle/>
-          <a:p>
-            <a:r>
-              <a:rPr lang="en-DE" dirty="0"/>
-              <a:t>dLRI</a:t>
-            </a:r>
-          </a:p>
-        </p:txBody>
-      </p:sp>
-      <p:sp>
-        <p:nvSpPr>
-          <p:cNvPr id="27" name="TextBox 26">
-            <a:extLst>
-              <a:ext uri="{FF2B5EF4-FFF2-40B4-BE49-F238E27FC236}">
-                <a16:creationId xmlns:a16="http://schemas.microsoft.com/office/drawing/2014/main" id="{96B36EE2-236F-EE7C-A7A7-F79B71127B33}"/>
-              </a:ext>
-            </a:extLst>
-          </p:cNvPr>
-          <p:cNvSpPr txBox="1"/>
-          <p:nvPr/>
-        </p:nvSpPr>
-        <p:spPr>
-          <a:xfrm>
-            <a:off x="153214" y="4673331"/>
-            <a:ext cx="664420" cy="369332"/>
-          </a:xfrm>
-          <a:prstGeom prst="rect">
-            <a:avLst/>
-          </a:prstGeom>
-          <a:noFill/>
-        </p:spPr>
-        <p:txBody>
-          <a:bodyPr wrap="square" rtlCol="0">
-            <a:spAutoFit/>
-          </a:bodyPr>
-          <a:lstStyle/>
-          <a:p>
-            <a:r>
-              <a:rPr lang="en-DE" dirty="0"/>
-              <a:t>dfLRI</a:t>
-            </a:r>
-          </a:p>
-        </p:txBody>
-      </p:sp>
-      <p:sp>
-        <p:nvSpPr>
-          <p:cNvPr id="28" name="TextBox 27">
-            <a:extLst>
-              <a:ext uri="{FF2B5EF4-FFF2-40B4-BE49-F238E27FC236}">
-                <a16:creationId xmlns:a16="http://schemas.microsoft.com/office/drawing/2014/main" id="{52F1960C-1AEB-C61E-857E-D6C765049ED7}"/>
-              </a:ext>
-            </a:extLst>
-          </p:cNvPr>
-          <p:cNvSpPr txBox="1"/>
-          <p:nvPr/>
-        </p:nvSpPr>
-        <p:spPr>
-          <a:xfrm>
-            <a:off x="279157" y="5319400"/>
-            <a:ext cx="589304" cy="369332"/>
-          </a:xfrm>
-          <a:prstGeom prst="rect">
-            <a:avLst/>
-          </a:prstGeom>
-          <a:noFill/>
-        </p:spPr>
-        <p:txBody>
-          <a:bodyPr wrap="square" rtlCol="0">
-            <a:spAutoFit/>
-          </a:bodyPr>
-          <a:lstStyle/>
-          <a:p>
-            <a:r>
-              <a:rPr lang="en-DE" dirty="0"/>
-              <a:t>fLRI</a:t>
-            </a:r>
-          </a:p>
-        </p:txBody>
-      </p:sp>
-      <p:sp>
-        <p:nvSpPr>
-          <p:cNvPr id="29" name="TextBox 28">
-            <a:extLst>
-              <a:ext uri="{FF2B5EF4-FFF2-40B4-BE49-F238E27FC236}">
-                <a16:creationId xmlns:a16="http://schemas.microsoft.com/office/drawing/2014/main" id="{059519CE-6869-D54A-B72A-61C570D88338}"/>
-              </a:ext>
-            </a:extLst>
-          </p:cNvPr>
-          <p:cNvSpPr txBox="1"/>
-          <p:nvPr/>
-        </p:nvSpPr>
-        <p:spPr>
-          <a:xfrm>
-            <a:off x="239689" y="5976745"/>
-            <a:ext cx="589304" cy="369332"/>
-          </a:xfrm>
-          <a:prstGeom prst="rect">
-            <a:avLst/>
-          </a:prstGeom>
-          <a:noFill/>
-        </p:spPr>
-        <p:txBody>
-          <a:bodyPr wrap="square" rtlCol="0">
-            <a:spAutoFit/>
-          </a:bodyPr>
-          <a:lstStyle/>
-          <a:p>
-            <a:r>
-              <a:rPr lang="en-DE" dirty="0"/>
-              <a:t>fLRE</a:t>
-            </a:r>
-          </a:p>
-        </p:txBody>
-      </p:sp>
-      <p:sp>
-        <p:nvSpPr>
-          <p:cNvPr id="30" name="TextBox 29">
-            <a:extLst>
-              <a:ext uri="{FF2B5EF4-FFF2-40B4-BE49-F238E27FC236}">
-                <a16:creationId xmlns:a16="http://schemas.microsoft.com/office/drawing/2014/main" id="{C346FAE1-7832-BE95-EEBC-B1484BAE3DFF}"/>
-              </a:ext>
-            </a:extLst>
-          </p:cNvPr>
-          <p:cNvSpPr txBox="1"/>
-          <p:nvPr/>
-        </p:nvSpPr>
-        <p:spPr>
-          <a:xfrm>
-            <a:off x="4307305" y="7748337"/>
-            <a:ext cx="184731" cy="369332"/>
-          </a:xfrm>
-          <a:prstGeom prst="rect">
-            <a:avLst/>
-          </a:prstGeom>
-          <a:noFill/>
-        </p:spPr>
-        <p:txBody>
-          <a:bodyPr wrap="none" rtlCol="0">
-            <a:spAutoFit/>
-          </a:bodyPr>
-          <a:lstStyle/>
-          <a:p>
-            <a:endParaRPr lang="en-DE"/>
-          </a:p>
-        </p:txBody>
-      </p:sp>
     </p:spTree>
     <p:extLst>
       <p:ext uri="{BB962C8B-B14F-4D97-AF65-F5344CB8AC3E}">
-        <p14:creationId xmlns:p14="http://schemas.microsoft.com/office/powerpoint/2010/main" val="970946740"/>
+        <p14:creationId xmlns:p14="http://schemas.microsoft.com/office/powerpoint/2010/main" val="4063010641"/>
       </p:ext>
     </p:extLst>
   </p:cSld>
@@ -4110,7 +3909,7 @@
 <file path=ppt/theme/theme1.xml><?xml version="1.0" encoding="utf-8"?>
 <a:theme xmlns:a="http://schemas.openxmlformats.org/drawingml/2006/main" name="Office Theme">
   <a:themeElements>
-    <a:clrScheme name="Office">
+    <a:clrScheme name="Office Theme">
       <a:dk1>
         <a:sysClr val="windowText" lastClr="000000"/>
       </a:dk1>
@@ -4148,7 +3947,7 @@
         <a:srgbClr val="954F72"/>
       </a:folHlink>
     </a:clrScheme>
-    <a:fontScheme name="Office">
+    <a:fontScheme name="Office Theme">
       <a:majorFont>
         <a:latin typeface="Calibri Light" panose="020F0302020204030204"/>
         <a:ea typeface=""/>
@@ -4183,23 +3982,6 @@
         <a:font script="Viet" typeface="Times New Roman"/>
         <a:font script="Uigh" typeface="Microsoft Uighur"/>
         <a:font script="Geor" typeface="Sylfaen"/>
-        <a:font script="Armn" typeface="Arial"/>
-        <a:font script="Bugi" typeface="Leelawadee UI"/>
-        <a:font script="Bopo" typeface="Microsoft JhengHei"/>
-        <a:font script="Java" typeface="Javanese Text"/>
-        <a:font script="Lisu" typeface="Segoe UI"/>
-        <a:font script="Mymr" typeface="Myanmar Text"/>
-        <a:font script="Nkoo" typeface="Ebrima"/>
-        <a:font script="Olck" typeface="Nirmala UI"/>
-        <a:font script="Osma" typeface="Ebrima"/>
-        <a:font script="Phag" typeface="Phagspa"/>
-        <a:font script="Syrn" typeface="Estrangelo Edessa"/>
-        <a:font script="Syrj" typeface="Estrangelo Edessa"/>
-        <a:font script="Syre" typeface="Estrangelo Edessa"/>
-        <a:font script="Sora" typeface="Nirmala UI"/>
-        <a:font script="Tale" typeface="Microsoft Tai Le"/>
-        <a:font script="Talu" typeface="Microsoft New Tai Lue"/>
-        <a:font script="Tfng" typeface="Ebrima"/>
       </a:majorFont>
       <a:minorFont>
         <a:latin typeface="Calibri" panose="020F0502020204030204"/>
@@ -4235,26 +4017,9 @@
         <a:font script="Viet" typeface="Arial"/>
         <a:font script="Uigh" typeface="Microsoft Uighur"/>
         <a:font script="Geor" typeface="Sylfaen"/>
-        <a:font script="Armn" typeface="Arial"/>
-        <a:font script="Bugi" typeface="Leelawadee UI"/>
-        <a:font script="Bopo" typeface="Microsoft JhengHei"/>
-        <a:font script="Java" typeface="Javanese Text"/>
-        <a:font script="Lisu" typeface="Segoe UI"/>
-        <a:font script="Mymr" typeface="Myanmar Text"/>
-        <a:font script="Nkoo" typeface="Ebrima"/>
-        <a:font script="Olck" typeface="Nirmala UI"/>
-        <a:font script="Osma" typeface="Ebrima"/>
-        <a:font script="Phag" typeface="Phagspa"/>
-        <a:font script="Syrn" typeface="Estrangelo Edessa"/>
-        <a:font script="Syrj" typeface="Estrangelo Edessa"/>
-        <a:font script="Syre" typeface="Estrangelo Edessa"/>
-        <a:font script="Sora" typeface="Nirmala UI"/>
-        <a:font script="Tale" typeface="Microsoft Tai Le"/>
-        <a:font script="Talu" typeface="Microsoft New Tai Lue"/>
-        <a:font script="Tfng" typeface="Ebrima"/>
       </a:minorFont>
     </a:fontScheme>
-    <a:fmtScheme name="Office">
+    <a:fmtScheme name="Office Theme">
       <a:fillStyleLst>
         <a:solidFill>
           <a:schemeClr val="phClr"/>

</xml_diff>